<commit_message>
Add system design template
</commit_message>
<xml_diff>
--- a/presentation/SystemDesign.pptx
+++ b/presentation/SystemDesign.pptx
@@ -5,7 +5,7 @@
     <p:sldMasterId id="2147483992" r:id="rId1"/>
   </p:sldMasterIdLst>
   <p:notesMasterIdLst>
-    <p:notesMasterId r:id="rId36"/>
+    <p:notesMasterId r:id="rId42"/>
   </p:notesMasterIdLst>
   <p:sldIdLst>
     <p:sldId id="256" r:id="rId2"/>
@@ -28,20 +28,26 @@
     <p:sldId id="274" r:id="rId19"/>
     <p:sldId id="275" r:id="rId20"/>
     <p:sldId id="277" r:id="rId21"/>
-    <p:sldId id="278" r:id="rId22"/>
-    <p:sldId id="279" r:id="rId23"/>
-    <p:sldId id="276" r:id="rId24"/>
-    <p:sldId id="269" r:id="rId25"/>
-    <p:sldId id="281" r:id="rId26"/>
-    <p:sldId id="282" r:id="rId27"/>
-    <p:sldId id="283" r:id="rId28"/>
-    <p:sldId id="284" r:id="rId29"/>
-    <p:sldId id="285" r:id="rId30"/>
-    <p:sldId id="286" r:id="rId31"/>
-    <p:sldId id="287" r:id="rId32"/>
-    <p:sldId id="288" r:id="rId33"/>
-    <p:sldId id="280" r:id="rId34"/>
-    <p:sldId id="289" r:id="rId35"/>
+    <p:sldId id="290" r:id="rId22"/>
+    <p:sldId id="278" r:id="rId23"/>
+    <p:sldId id="279" r:id="rId24"/>
+    <p:sldId id="276" r:id="rId25"/>
+    <p:sldId id="291" r:id="rId26"/>
+    <p:sldId id="269" r:id="rId27"/>
+    <p:sldId id="281" r:id="rId28"/>
+    <p:sldId id="282" r:id="rId29"/>
+    <p:sldId id="283" r:id="rId30"/>
+    <p:sldId id="284" r:id="rId31"/>
+    <p:sldId id="285" r:id="rId32"/>
+    <p:sldId id="286" r:id="rId33"/>
+    <p:sldId id="287" r:id="rId34"/>
+    <p:sldId id="288" r:id="rId35"/>
+    <p:sldId id="280" r:id="rId36"/>
+    <p:sldId id="292" r:id="rId37"/>
+    <p:sldId id="289" r:id="rId38"/>
+    <p:sldId id="293" r:id="rId39"/>
+    <p:sldId id="294" r:id="rId40"/>
+    <p:sldId id="295" r:id="rId41"/>
   </p:sldIdLst>
   <p:sldSz cx="12192000" cy="6858000"/>
   <p:notesSz cx="6858000" cy="9144000"/>
@@ -256,6 +262,202 @@
 </inkml:ink>
 </file>
 
+<file path=ppt/ink/ink13.xml><?xml version="1.0" encoding="utf-8"?>
+<inkml:ink xmlns:inkml="http://www.w3.org/2003/InkML">
+  <inkml:definitions>
+    <inkml:context xml:id="ctx0">
+      <inkml:inkSource xml:id="inkSrc0">
+        <inkml:traceFormat>
+          <inkml:channel name="X" type="integer" min="-2.14748E9" max="2.14748E9" units="cm"/>
+          <inkml:channel name="Y" type="integer" min="-2.14748E9" max="2.14748E9" units="cm"/>
+          <inkml:channel name="F" type="integer" max="32767" units="dev"/>
+        </inkml:traceFormat>
+        <inkml:channelProperties>
+          <inkml:channelProperty channel="X" name="resolution" value="1000" units="1/cm"/>
+          <inkml:channelProperty channel="Y" name="resolution" value="1000" units="1/cm"/>
+          <inkml:channelProperty channel="F" name="resolution" value="0" units="1/dev"/>
+        </inkml:channelProperties>
+      </inkml:inkSource>
+      <inkml:timestamp xml:id="ts0" timeString="2025-10-21T02:54:32.518"/>
+    </inkml:context>
+    <inkml:brush xml:id="br0">
+      <inkml:brushProperty name="width" value="0.035" units="cm"/>
+      <inkml:brushProperty name="height" value="0.035" units="cm"/>
+      <inkml:brushProperty name="color" value="#E71224"/>
+    </inkml:brush>
+  </inkml:definitions>
+  <inkml:trace contextRef="#ctx0" brushRef="#br0">3901 541 24575,'-41'0'0,"-7"0"0,-9 0 0,-24 0 0,-10 0 0,0 0 0,-8 0 0,-3 0-982,13 0 1,-3 0-1,-1 0 1,-2 0 981,14 1 0,-1 0 0,0 0 0,-2 1 0,0 2-356,-7 1 1,-1 1 0,-1 1 0,1 2-1,0 3 356,1 2 0,0 2 0,1 3 0,0 3 0,1 2 0,-1 4 0,0 2 0,1 3 0,2 2 0,1 3 0,3 2 0,1 3 0,1 2 0,3 3 0,2 3 0,4 2 0,1 4 0,3 2 0,3 4 0,5 2 0,4 1 0,5 4 0,3 3 0,3 1 0,4 1 0,4 0 0,2 1 0,4 2 0,4 1 0,7 1 0,5 2 0,5 3 0,6 0 0,6 0 0,5-3 0,7-3 0,6 0 0,5-2 0,7-3 0,5-4 0,6-3 0,6-4 0,6-3 0,6-4 0,5-5 0,5-7 0,7-4 0,5-5 0,3-2 0,3-5 0,1-2-471,-7-4 1,3-5 0,2-2-1,2-2 1,1-3 0,1-2 0,1-1 470,-4-3 0,2-1 0,1-3 0,2-1 0,-1-2 0,2-2 0,-1 0 0,-1-2 0,4-2 0,0-1 0,1-1 0,0-3 0,-1 0 0,-1-2 0,-1-1 0,-3-2-285,2-2 0,0-2 0,-3-1 0,-1-2 1,-1-1-1,-2-2 0,-2-2 285,7-5 0,-1-2 0,-3-2 0,-2-2 0,-3-2 0,-5-1 37,-1-4 0,-3-2 0,-5-2 1,-4-1-1,-5-1-37,-1-6 0,-5-1 0,-6-2 0,-4 0 407,4-14 1,-6-1 0,-8 1-408,-12 9 0,-6 1 0,-4 1 0,-2-25 0,-7 2 0,-7-1 0,-4-2 0,0 26 0,0-1 0,-3-2 1168,-2-8 1,-1-2-1,-3-2-1168,-3-8 0,-2-2 0,-1-1 0,-3 0 0,-2 1 0,-1 1 0,-1 9 0,-2 2 0,-2 4 969,2 11 0,-3 3 0,-2 6-969,-18-10 0,-6 11 787,-2 15 0,-5 10-787,-11 7 0,-5 12 0,-13 13 0,-3 13-179,24 1 1,-2 7 0,-1 2 178,-8 7 0,-1 5 0,-1 2 0,20-6 0,-1 3 0,0 0 0,1 1 0,-17 9 0,2 1 0,2 0 0,9-4 0,2 0 0,4-2 517,-14 11 1,7-4-518,23-12 0,6-3 33,-11 12 0,34-26 1,17-12-1</inkml:trace>
+</inkml:ink>
+</file>
+
+<file path=ppt/ink/ink14.xml><?xml version="1.0" encoding="utf-8"?>
+<inkml:ink xmlns:inkml="http://www.w3.org/2003/InkML">
+  <inkml:definitions>
+    <inkml:context xml:id="ctx0">
+      <inkml:inkSource xml:id="inkSrc0">
+        <inkml:traceFormat>
+          <inkml:channel name="X" type="integer" min="-2.14748E9" max="2.14748E9" units="cm"/>
+          <inkml:channel name="Y" type="integer" min="-2.14748E9" max="2.14748E9" units="cm"/>
+        </inkml:traceFormat>
+        <inkml:channelProperties>
+          <inkml:channelProperty channel="X" name="resolution" value="1000" units="1/cm"/>
+          <inkml:channelProperty channel="Y" name="resolution" value="1000" units="1/cm"/>
+        </inkml:channelProperties>
+      </inkml:inkSource>
+      <inkml:timestamp xml:id="ts0" timeString="2025-10-21T02:54:37.658"/>
+    </inkml:context>
+    <inkml:brush xml:id="br0">
+      <inkml:brushProperty name="width" value="0.3" units="cm"/>
+      <inkml:brushProperty name="height" value="0.6" units="cm"/>
+      <inkml:brushProperty name="color" value="#FFFC00"/>
+      <inkml:brushProperty name="tip" value="rectangle"/>
+      <inkml:brushProperty name="rasterOp" value="maskPen"/>
+    </inkml:brush>
+  </inkml:definitions>
+  <inkml:trace contextRef="#ctx0" brushRef="#br0">1549 1934,'-94'14,"0"0,8 14,-5 8,-3 7,24-7,-3 5,-1 2,0 4,2 1,0 3,0 4,2 1,3 3,3 1,-6 13,4 3,6 1,8 2,11-6,6 2,7 1,10-2,7 12,12 0,18-4,14-17,14-2,10-4,8-5,10-8,9-5,9-5,5-5,5-2,-19-10,4-1,3-3,4-3,2-1,2-3,1-2,2-1,-16-3,3-1,2-2,0-1,3-2,-1-1,2-1,-1-2,1-2,-1 0,-1-2,3-2,1-2,0-1,0-2,0-1,0-2,0-1,-1-2,0-1,-1-2,0-1,-2-1,2-2,-1-1,-1-2,0-2,0 0,-2-3,-1-1,-1-1,-3-2,-1-1,1-4,0-2,-1-1,-2-3,-2-1,-1-1,-3-1,-2-1,-3-2,-3 0,5-8,-1-1,-4-2,-3-1,-3-2,-5 0,-4-2,-6 0,-1-4,-4-1,-3-2,-6-1,-7 1,-9 0,-11 2,-12-10,-11 0,-10 0,-10 3,-8 3,-8 5,2 17,-9 3,-6 2,-6 3,-4 3,-3 2,-2 2,0 2,-2 3,-3 2,-4 3,-1 2,-4 3,0 1,-3 2,0 1,-1 3,11 4,-2 1,-2 2,-2 1,0 2,-1 1,0 2,0 1,0 1,1 1,1 1,-5 1,-1 1,1 2,-1 1,1 1,0 2,1 1,1 2,1 1,2 1,-2 1,1 2,1 1,1 2,0 1,2 1,1 2,2 1,2 1,-13 4,1 2,2 2,2 2,3 2,3 2,5 3,-9 10,5 4,5 3,4 2,5 3,-3 7,5 5,7 1,7 1,1 12,9 2,9-1,11-9,7 0,5-2,1 20,10-2,10-9,10-3,10-2,10-3,15-2,8-3,7-2,2-3,-4-6,-2-5,-10-10,-5-5,13 9,-27-22,-19-14,-7-7,11-1,-6 0,11 0</inkml:trace>
+</inkml:ink>
+</file>
+
+<file path=ppt/ink/ink15.xml><?xml version="1.0" encoding="utf-8"?>
+<inkml:ink xmlns:inkml="http://www.w3.org/2003/InkML">
+  <inkml:definitions>
+    <inkml:context xml:id="ctx0">
+      <inkml:inkSource xml:id="inkSrc0">
+        <inkml:traceFormat>
+          <inkml:channel name="X" type="integer" min="-2.14748E9" max="2.14748E9" units="cm"/>
+          <inkml:channel name="Y" type="integer" min="-2.14748E9" max="2.14748E9" units="cm"/>
+        </inkml:traceFormat>
+        <inkml:channelProperties>
+          <inkml:channelProperty channel="X" name="resolution" value="1000" units="1/cm"/>
+          <inkml:channelProperty channel="Y" name="resolution" value="1000" units="1/cm"/>
+        </inkml:channelProperties>
+      </inkml:inkSource>
+      <inkml:timestamp xml:id="ts0" timeString="2025-10-21T02:54:42.129"/>
+    </inkml:context>
+    <inkml:brush xml:id="br0">
+      <inkml:brushProperty name="width" value="0.3" units="cm"/>
+      <inkml:brushProperty name="height" value="0.6" units="cm"/>
+      <inkml:brushProperty name="color" value="#FFFC00"/>
+      <inkml:brushProperty name="tip" value="rectangle"/>
+      <inkml:brushProperty name="rasterOp" value="maskPen"/>
+    </inkml:brush>
+  </inkml:definitions>
+  <inkml:trace contextRef="#ctx0" brushRef="#br0">966 4223,'-5'-85,"-1"0,1 0,2 9,0-2,0-3,1-3,-1 1,1-3,-1-2,1-3,3-1,0 5,1-2,1-1,1-2,3 0,2 0,3-5,2 0,2-2,4 1,3 0,6-1,-1 19,2-1,4-1,2 1,3 0,2 1,2 2,3 3,2 0,2 2,3 0,3 2,1 2,3 2,1 2,3 2,2 1,3 2,2 2,2 2,2 2,1 3,1 1,0 3,1 3,1 2,2 2,1 2,1 2,0 3,0 3,-1 3,7 2,0 5,0 2,1 4,0 1,0 1,0 1,0 1,1 1,0 2,0 1,-1 1,0 2,-2 1,8 1,-2 1,0 2,-1 2,-1 1,-1 0,11 3,-1 1,-2 2,-1 2,-2 3,-7 0,-1 2,-1 2,-3 2,-2 4,13 10,-4 3,-2 5,-3 5,-2 4,-3 5,-3 5,-5 5,-18-10,-2 5,-4 2,-2 3,-3 2,0 6,-4 3,-3 3,-2 2,-2 2,-1 5,-4 2,-1 2,-3 1,-2-1,-1-1,-2 1,-2 0,-1-1,-1 1,-1-3,-1 1,-1 0,-1-1,-1-1,-2-6,0 0,-1-1,-2-1,0-1,0 11,-1-2,-2-2,-5 1,-4-2,-4-1,-4-1,-7-2,-5-2,-5-3,-6-1,-6-2,-9 3,-6-2,-7-2,-4-1,4-11,-5 0,-3-3,-3 0,-3-3,8-7,-3-1,-1-2,-3-1,-1-1,-1-2,-6 1,-2-1,-1-2,-1-1,-2-2,-1-3,10-5,0-1,-2-3,-1 0,0-2,0-2,-1 0,0-3,-2-1,0-1,0-2,0-1,0-1,2-2,-11 1,0-1,1-3,0 0,1-3,1-1,4-3,0-1,1-2,1-1,1-2,1-1,-9-2,1-1,2-3,1-1,2-2,7-1,2-3,2 0,0-2,1-1,-15-7,0-2,3 0,2-2,9 3,2-1,2 0,1-1,-14-6,2-1,4 0,9 3,3 1,3 0,-18-12,5-1,8 0,5-1,7 2,4-2,4 0,3 0,1 1,2 0,6 5,0 1,3 0,1 1,-29-33,8 4,11 6,10 5,14 3,11 1,9 25,3 5</inkml:trace>
+</inkml:ink>
+</file>
+
+<file path=ppt/ink/ink16.xml><?xml version="1.0" encoding="utf-8"?>
+<inkml:ink xmlns:inkml="http://www.w3.org/2003/InkML">
+  <inkml:definitions>
+    <inkml:context xml:id="ctx0">
+      <inkml:inkSource xml:id="inkSrc0">
+        <inkml:traceFormat>
+          <inkml:channel name="X" type="integer" min="-2.14748E9" max="2.14748E9" units="cm"/>
+          <inkml:channel name="Y" type="integer" min="-2.14748E9" max="2.14748E9" units="cm"/>
+        </inkml:traceFormat>
+        <inkml:channelProperties>
+          <inkml:channelProperty channel="X" name="resolution" value="1000" units="1/cm"/>
+          <inkml:channelProperty channel="Y" name="resolution" value="1000" units="1/cm"/>
+        </inkml:channelProperties>
+      </inkml:inkSource>
+      <inkml:timestamp xml:id="ts0" timeString="2025-10-21T02:54:43.843"/>
+    </inkml:context>
+    <inkml:brush xml:id="br0">
+      <inkml:brushProperty name="width" value="0.3" units="cm"/>
+      <inkml:brushProperty name="height" value="0.6" units="cm"/>
+      <inkml:brushProperty name="color" value="#FFFC00"/>
+      <inkml:brushProperty name="tip" value="rectangle"/>
+      <inkml:brushProperty name="rasterOp" value="maskPen"/>
+    </inkml:brush>
+  </inkml:definitions>
+  <inkml:trace contextRef="#ctx0" brushRef="#br0">6003 643,'-85'2,"0"0,14-2,-7 1,-5 0,-5-1,9 1,-5-1,-4 0,-2 0,-2-1,-1 1,2 0,-3 0,-1 0,-2 0,0 0,-1 0,0 0,7 0,0 0,-2 0,0 0,0 0,1 0,0 0,1 0,-8 1,0-1,0 0,1 0,1 1,1 0,3 2,-5-1,2 1,2 1,1 1,2 1,0 3,-8 3,1 1,2 3,3 2,3 4,-7 6,5 4,2 3,3 6,4 2,3 5,2 4,1 4,14-7,1 4,2 2,1 1,1 2,-10 14,3 2,2 2,1 2,13-13,2 2,1 2,1 0,3 0,-8 16,3 1,3 1,3-1,8-7,2 0,4 0,1-1,-2 20,3-1,7-3,7-12,5-3,9-1,9-3,10-1,8-2,13 5,10-2,9 1,-11-21,4 1,5-1,3 1,3 0,2 0,3-1,3 2,2-1,3-1,1 1,-2-4,1 0,2 0,2 0,2-1,0-1,1 0,-6-5,1 0,1-1,1 0,0-1,2-1,0-1,0-2,2-2,1 0,0-1,1-2,1-1,0-1,1-3,0 0,2-3,0 0,0-2,1-2,1-1,1-2,0-3,2-1,-5-4,1-1,0-2,2-1,0-2,1-3,0-1,1-2,0-2,-5-2,1-2,1-1,0-3,0-1,1-2,0-1,-1-2,1-2,0-1,-5-1,1-1,0-2,0-2,0-1,0-1,0-2,0-1,-1-1,-1-2,-1-1,1-2,0-1,0-1,-1-2,0-2,-1 0,-1-2,0-1,-2 0,0-2,-2-1,-2 1,-2-2,0-2,-1 0,0-2,-2 0,-1-1,0 0,-2 0,0 0,-2 1,8-8,0 0,-2-1,0 0,-3 0,0 0,-3 1,-1 0,-2 1,5-6,-1-1,-3 1,-1 1,-3 1,-2 1,-3 2,8-8,-2 2,-4 1,-4 3,-5 4,5-8,-7 5,-8 3,-1-6,-17 1,-30 2,-18-1,-12 8,-13-2,-6-2,-1-1,-5-2,-5-3,-2-1,2 3,-3-3,-3 0,0-1,-1 0,11 10,-1-1,0 0,0 0,-1 0,1 2,0-1,-1 1,1 0,-1 1,1 1,0 2,-8-6,0 1,1 1,-1 3,1 2,-9-3,0 3,0 3,-2 4,3 5,-1 3,-1 5,-1 4,0 5,-2 5,1 4,-2 5,1 3,-1 4,0 4,-1 4,-5 3,0 5,0 3,1 3,-2 2,0 4,2 3,0 2,4 2,2 3,0 1,1 1,2-1,0 1,2 0,3 1,-13 6,4 1,4-2,10-5,3-1,4-1,-12 7,8-2,19-12,5-3,-12 8,32-20,14-10</inkml:trace>
+</inkml:ink>
+</file>
+
+<file path=ppt/ink/ink17.xml><?xml version="1.0" encoding="utf-8"?>
+<inkml:ink xmlns:inkml="http://www.w3.org/2003/InkML">
+  <inkml:definitions>
+    <inkml:context xml:id="ctx0">
+      <inkml:inkSource xml:id="inkSrc0">
+        <inkml:traceFormat>
+          <inkml:channel name="X" type="integer" min="-2.14748E9" max="2.14748E9" units="cm"/>
+          <inkml:channel name="Y" type="integer" min="-2.14748E9" max="2.14748E9" units="cm"/>
+        </inkml:traceFormat>
+        <inkml:channelProperties>
+          <inkml:channelProperty channel="X" name="resolution" value="1000" units="1/cm"/>
+          <inkml:channelProperty channel="Y" name="resolution" value="1000" units="1/cm"/>
+        </inkml:channelProperties>
+      </inkml:inkSource>
+      <inkml:timestamp xml:id="ts0" timeString="2025-10-21T02:54:57.855"/>
+    </inkml:context>
+    <inkml:brush xml:id="br0">
+      <inkml:brushProperty name="width" value="0.3" units="cm"/>
+      <inkml:brushProperty name="height" value="0.6" units="cm"/>
+      <inkml:brushProperty name="color" value="#FFFC00"/>
+      <inkml:brushProperty name="tip" value="rectangle"/>
+      <inkml:brushProperty name="rasterOp" value="maskPen"/>
+    </inkml:brush>
+  </inkml:definitions>
+  <inkml:trace contextRef="#ctx0" brushRef="#br0">0 0,'68'48,"3"1,7 5,-33-22,1 2,5 5,2 2,10 7,3 2,4 3,1 1,0-1,-1-1,-6-4,-1-2,-12-8,-1-3,32 18,-12-13,-3-3,3 0,0 1,-5-3,-13-9,-14-6,-21-11,-8-3</inkml:trace>
+</inkml:ink>
+</file>
+
+<file path=ppt/ink/ink18.xml><?xml version="1.0" encoding="utf-8"?>
+<inkml:ink xmlns:inkml="http://www.w3.org/2003/InkML">
+  <inkml:definitions>
+    <inkml:context xml:id="ctx0">
+      <inkml:inkSource xml:id="inkSrc0">
+        <inkml:traceFormat>
+          <inkml:channel name="X" type="integer" min="-2.14748E9" max="2.14748E9" units="cm"/>
+          <inkml:channel name="Y" type="integer" min="-2.14748E9" max="2.14748E9" units="cm"/>
+        </inkml:traceFormat>
+        <inkml:channelProperties>
+          <inkml:channelProperty channel="X" name="resolution" value="1000" units="1/cm"/>
+          <inkml:channelProperty channel="Y" name="resolution" value="1000" units="1/cm"/>
+        </inkml:channelProperties>
+      </inkml:inkSource>
+      <inkml:timestamp xml:id="ts0" timeString="2025-10-21T02:54:59.090"/>
+    </inkml:context>
+    <inkml:brush xml:id="br0">
+      <inkml:brushProperty name="width" value="0.3" units="cm"/>
+      <inkml:brushProperty name="height" value="0.6" units="cm"/>
+      <inkml:brushProperty name="color" value="#FFFC00"/>
+      <inkml:brushProperty name="tip" value="rectangle"/>
+      <inkml:brushProperty name="rasterOp" value="maskPen"/>
+    </inkml:brush>
+  </inkml:definitions>
+  <inkml:trace contextRef="#ctx0" brushRef="#br0">994 1,'22'95,"0"-38,7 2,14 12,8 4,-10-15,2 2,2 1,5 5,1 1,-1 0,-3-3,0 0,-2-2,14 19,-4-5,-13-19,-4-7,8 12,-18-26,-17-20,-24-11,-37-6,3-1,-7 0,-25 1,-7 2,15-1,-3 2,-1 1,-3 2,-1 1,2 2,1 2,1 2,3 1,-21 7,6 3,22-3,6 0,-26 10,40-10,24-9,11-4,-1-1,-14 5,-19 11,-21 11,-12 5,5 0,18-9,26-15,16-7</inkml:trace>
+</inkml:ink>
+</file>
+
+<file path=ppt/ink/ink19.xml><?xml version="1.0" encoding="utf-8"?>
+<inkml:ink xmlns:inkml="http://www.w3.org/2003/InkML">
+  <inkml:definitions>
+    <inkml:context xml:id="ctx0">
+      <inkml:inkSource xml:id="inkSrc0">
+        <inkml:traceFormat>
+          <inkml:channel name="X" type="integer" min="-2.14748E9" max="2.14748E9" units="cm"/>
+          <inkml:channel name="Y" type="integer" min="-2.14748E9" max="2.14748E9" units="cm"/>
+        </inkml:traceFormat>
+        <inkml:channelProperties>
+          <inkml:channelProperty channel="X" name="resolution" value="1000" units="1/cm"/>
+          <inkml:channelProperty channel="Y" name="resolution" value="1000" units="1/cm"/>
+        </inkml:channelProperties>
+      </inkml:inkSource>
+      <inkml:timestamp xml:id="ts0" timeString="2025-10-21T02:55:13.085"/>
+    </inkml:context>
+    <inkml:brush xml:id="br0">
+      <inkml:brushProperty name="width" value="0.3" units="cm"/>
+      <inkml:brushProperty name="height" value="0.6" units="cm"/>
+      <inkml:brushProperty name="color" value="#FFFC00"/>
+      <inkml:brushProperty name="tip" value="rectangle"/>
+      <inkml:brushProperty name="rasterOp" value="maskPen"/>
+    </inkml:brush>
+  </inkml:definitions>
+  <inkml:trace contextRef="#ctx0" brushRef="#br0">1 0,'0'82,"0"1,0-9,0 6,0 6,0 2,0 8,0 4,0 3,0-19,0 3,0 2,0 3,0 1,0 1,0-1,0 3,0 0,0 3,0 0,0 1,1 1,1-6,-1 1,1 0,0 2,1 0,0 0,0 1,0 1,0-9,1 2,-1-1,1 2,0-1,1 1,0-1,0 1,0-1,1 2,0-1,1 0,0 1,0-1,0 1,1-1,0 1,1 0,0 1,0-1,1 1,1 0,-1 0,1 0,1 1,-1-1,0 1,0-8,0 0,0 0,0 1,1-1,0 1,-1-1,2 1,-1 0,0 0,1 0,0 0,0 0,1 1,0-1,0 1,0-1,0 0,0 0,0 0,2 8,0 0,1 1,-1-1,1-1,0 1,0-2,-1 0,1-2,0 4,0-1,1-1,-1 0,0-1,0-2,0 0,-1-2,2 5,-1-2,0-1,-1-1,0-1,0-2,0 0,0 4,0-2,0-1,-1-1,0-1,-1 0,1 12,-1-1,0-1,-1 0,0 0,-1 0,-1-1,0 1,0-1,-1 0,0-2,-1-1,0 1,-1-1,0-1,0-1,-1-1,0 0,0-1,0-1,0-3,0 0,-1-1,1-1,-1 1,1-2,0 0,0 0,0-1,0 0,2 17,0-1,1 1,-1-1,1 0,-1 0,1-1,-1 1,0-3,0 1,0-1,0-1,-1-5,0 1,0-2,-1-2,-1-6,0-1,-1-2,0-2,0 13,-1-4,-1-4,0 18,-2-8,-1-18,0-6,0 32,0-26,0-18,2-15,1-13,1-10,-1 0,0 28,7 53,-2-29,3 4,2 11,1 0,1-8,0-4,-3-18,0-5,3 16,-8-41,-5-15</inkml:trace>
+</inkml:ink>
+</file>
+
 <file path=ppt/ink/ink2.xml><?xml version="1.0" encoding="utf-8"?>
 <inkml:ink xmlns:inkml="http://www.w3.org/2003/InkML">
   <inkml:definitions>
@@ -283,6 +485,286 @@
 </inkml:ink>
 </file>
 
+<file path=ppt/ink/ink20.xml><?xml version="1.0" encoding="utf-8"?>
+<inkml:ink xmlns:inkml="http://www.w3.org/2003/InkML">
+  <inkml:definitions>
+    <inkml:context xml:id="ctx0">
+      <inkml:inkSource xml:id="inkSrc0">
+        <inkml:traceFormat>
+          <inkml:channel name="X" type="integer" min="-2.14748E9" max="2.14748E9" units="cm"/>
+          <inkml:channel name="Y" type="integer" min="-2.14748E9" max="2.14748E9" units="cm"/>
+        </inkml:traceFormat>
+        <inkml:channelProperties>
+          <inkml:channelProperty channel="X" name="resolution" value="1000" units="1/cm"/>
+          <inkml:channelProperty channel="Y" name="resolution" value="1000" units="1/cm"/>
+        </inkml:channelProperties>
+      </inkml:inkSource>
+      <inkml:timestamp xml:id="ts0" timeString="2025-10-21T02:55:57.339"/>
+    </inkml:context>
+    <inkml:brush xml:id="br0">
+      <inkml:brushProperty name="width" value="0.3" units="cm"/>
+      <inkml:brushProperty name="height" value="0.6" units="cm"/>
+      <inkml:brushProperty name="color" value="#FFFC00"/>
+      <inkml:brushProperty name="tip" value="rectangle"/>
+      <inkml:brushProperty name="rasterOp" value="maskPen"/>
+    </inkml:brush>
+  </inkml:definitions>
+  <inkml:trace contextRef="#ctx0" brushRef="#br0">2 0,'0'75,"0"-1,0 11,0 5,0-18,0 2,0 3,0 13,0 2,0 2,-1 1,1 2,0-1,1-1,1 0,1-4,-1-8,1-2,1-6,1 10,0-9,0-19,0-8,-3-1,-1-32,-1-18</inkml:trace>
+</inkml:ink>
+</file>
+
+<file path=ppt/ink/ink21.xml><?xml version="1.0" encoding="utf-8"?>
+<inkml:ink xmlns:inkml="http://www.w3.org/2003/InkML">
+  <inkml:definitions>
+    <inkml:context xml:id="ctx0">
+      <inkml:inkSource xml:id="inkSrc0">
+        <inkml:traceFormat>
+          <inkml:channel name="X" type="integer" min="-2.14748E9" max="2.14748E9" units="cm"/>
+          <inkml:channel name="Y" type="integer" min="-2.14748E9" max="2.14748E9" units="cm"/>
+        </inkml:traceFormat>
+        <inkml:channelProperties>
+          <inkml:channelProperty channel="X" name="resolution" value="1000" units="1/cm"/>
+          <inkml:channelProperty channel="Y" name="resolution" value="1000" units="1/cm"/>
+        </inkml:channelProperties>
+      </inkml:inkSource>
+      <inkml:timestamp xml:id="ts0" timeString="2025-10-21T02:55:58.628"/>
+    </inkml:context>
+    <inkml:brush xml:id="br0">
+      <inkml:brushProperty name="width" value="0.3" units="cm"/>
+      <inkml:brushProperty name="height" value="0.6" units="cm"/>
+      <inkml:brushProperty name="color" value="#FFFC00"/>
+      <inkml:brushProperty name="tip" value="rectangle"/>
+      <inkml:brushProperty name="rasterOp" value="maskPen"/>
+    </inkml:brush>
+  </inkml:definitions>
+  <inkml:trace contextRef="#ctx0" brushRef="#br0">0 0,'2'82,"0"0,-1 10,0 6,0-8,-2 6,1 3,0-13,0 2,0 2,0 0,0 6,0 1,0 1,0 1,0-15,0 1,0 0,0 1,0-2,0-1,0-1,0 0,0-1,0-1,0 9,0 0,0-3,0-2,0 13,0-4,0-5,0 13,0-11,0-33,0-8,0 12,0-35,0-15</inkml:trace>
+</inkml:ink>
+</file>
+
+<file path=ppt/ink/ink22.xml><?xml version="1.0" encoding="utf-8"?>
+<inkml:ink xmlns:inkml="http://www.w3.org/2003/InkML">
+  <inkml:definitions>
+    <inkml:context xml:id="ctx0">
+      <inkml:inkSource xml:id="inkSrc0">
+        <inkml:traceFormat>
+          <inkml:channel name="X" type="integer" min="-2.14748E9" max="2.14748E9" units="cm"/>
+          <inkml:channel name="Y" type="integer" min="-2.14748E9" max="2.14748E9" units="cm"/>
+        </inkml:traceFormat>
+        <inkml:channelProperties>
+          <inkml:channelProperty channel="X" name="resolution" value="1000" units="1/cm"/>
+          <inkml:channelProperty channel="Y" name="resolution" value="1000" units="1/cm"/>
+        </inkml:channelProperties>
+      </inkml:inkSource>
+      <inkml:timestamp xml:id="ts0" timeString="2025-10-21T02:56:00.074"/>
+    </inkml:context>
+    <inkml:brush xml:id="br0">
+      <inkml:brushProperty name="width" value="0.3" units="cm"/>
+      <inkml:brushProperty name="height" value="0.6" units="cm"/>
+      <inkml:brushProperty name="color" value="#FFFC00"/>
+      <inkml:brushProperty name="tip" value="rectangle"/>
+      <inkml:brushProperty name="rasterOp" value="maskPen"/>
+    </inkml:brush>
+  </inkml:definitions>
+  <inkml:trace contextRef="#ctx0" brushRef="#br0">0 0,'0'65,"0"1,0 10,0 9,0 5,0-7,0 4,0 3,0 1,0-8,0 3,0 0,0 1,0-1,0 0,0-1,0 1,0-2,0-2,0 10,0-2,0-2,0-1,0-7,0 0,0-3,0-2,0 7,0-3,0-4,0 17,0-6,0-21,0-5,0 22,0-31,0-26,0-14,0-3</inkml:trace>
+</inkml:ink>
+</file>
+
+<file path=ppt/ink/ink23.xml><?xml version="1.0" encoding="utf-8"?>
+<inkml:ink xmlns:inkml="http://www.w3.org/2003/InkML">
+  <inkml:definitions>
+    <inkml:context xml:id="ctx0">
+      <inkml:inkSource xml:id="inkSrc0">
+        <inkml:traceFormat>
+          <inkml:channel name="X" type="integer" min="-2.14748E9" max="2.14748E9" units="cm"/>
+          <inkml:channel name="Y" type="integer" min="-2.14748E9" max="2.14748E9" units="cm"/>
+        </inkml:traceFormat>
+        <inkml:channelProperties>
+          <inkml:channelProperty channel="X" name="resolution" value="1000" units="1/cm"/>
+          <inkml:channelProperty channel="Y" name="resolution" value="1000" units="1/cm"/>
+        </inkml:channelProperties>
+      </inkml:inkSource>
+      <inkml:timestamp xml:id="ts0" timeString="2025-10-21T02:56:31.084"/>
+    </inkml:context>
+    <inkml:brush xml:id="br0">
+      <inkml:brushProperty name="width" value="0.3" units="cm"/>
+      <inkml:brushProperty name="height" value="0.6" units="cm"/>
+      <inkml:brushProperty name="color" value="#FFFC00"/>
+      <inkml:brushProperty name="tip" value="rectangle"/>
+      <inkml:brushProperty name="rasterOp" value="maskPen"/>
+    </inkml:brush>
+  </inkml:definitions>
+  <inkml:trace contextRef="#ctx0" brushRef="#br0">0 1,'58'50,"0"1,-8-4,2 4,1 5,-3-2,1 3,1 4,1 0,6 8,2 3,1 1,0 0,1 2,1 1,0 0,0-2,-3-3,1 0,-1-1,-1-3,-5-7,0-2,-1-1,-1-3,9 8,-2-3,-2-4,8 8,-5-8,-18-17,-6-6,5 4,-25-25,-10-10,-5-5</inkml:trace>
+</inkml:ink>
+</file>
+
+<file path=ppt/ink/ink24.xml><?xml version="1.0" encoding="utf-8"?>
+<inkml:ink xmlns:inkml="http://www.w3.org/2003/InkML">
+  <inkml:definitions>
+    <inkml:context xml:id="ctx0">
+      <inkml:inkSource xml:id="inkSrc0">
+        <inkml:traceFormat>
+          <inkml:channel name="X" type="integer" min="-2.14748E9" max="2.14748E9" units="cm"/>
+          <inkml:channel name="Y" type="integer" min="-2.14748E9" max="2.14748E9" units="cm"/>
+        </inkml:traceFormat>
+        <inkml:channelProperties>
+          <inkml:channelProperty channel="X" name="resolution" value="1000" units="1/cm"/>
+          <inkml:channelProperty channel="Y" name="resolution" value="1000" units="1/cm"/>
+        </inkml:channelProperties>
+      </inkml:inkSource>
+      <inkml:timestamp xml:id="ts0" timeString="2025-10-21T02:56:32.016"/>
+    </inkml:context>
+    <inkml:brush xml:id="br0">
+      <inkml:brushProperty name="width" value="0.3" units="cm"/>
+      <inkml:brushProperty name="height" value="0.6" units="cm"/>
+      <inkml:brushProperty name="color" value="#FFFC00"/>
+      <inkml:brushProperty name="tip" value="rectangle"/>
+      <inkml:brushProperty name="rasterOp" value="maskPen"/>
+    </inkml:brush>
+  </inkml:definitions>
+  <inkml:trace contextRef="#ctx0" brushRef="#br0">2427 1,'-51'62,"0"0,6-8,-6 5,-4 5,-2 5,4-5,-3 4,-2 4,-2 3,-1 1,0 2,8-12,0 3,-2 1,0 2,0 0,0 1,0 0,2-1,-1 1,1 1,0 0,0 1,0-1,2 1,0-1,1-1,-4 7,1 0,0 0,2 0,1-2,1-2,2-2,-6 10,2-2,2-2,2-3,2-3,1 0,1-2,3-4,2-5,-15 27,9-14,9-10,20-39,14-32,1-12</inkml:trace>
+</inkml:ink>
+</file>
+
+<file path=ppt/ink/ink25.xml><?xml version="1.0" encoding="utf-8"?>
+<inkml:ink xmlns:inkml="http://www.w3.org/2003/InkML">
+  <inkml:definitions>
+    <inkml:context xml:id="ctx0">
+      <inkml:inkSource xml:id="inkSrc0">
+        <inkml:traceFormat>
+          <inkml:channel name="X" type="integer" min="-2.14748E9" max="2.14748E9" units="cm"/>
+          <inkml:channel name="Y" type="integer" min="-2.14748E9" max="2.14748E9" units="cm"/>
+        </inkml:traceFormat>
+        <inkml:channelProperties>
+          <inkml:channelProperty channel="X" name="resolution" value="1000" units="1/cm"/>
+          <inkml:channelProperty channel="Y" name="resolution" value="1000" units="1/cm"/>
+        </inkml:channelProperties>
+      </inkml:inkSource>
+      <inkml:timestamp xml:id="ts0" timeString="2025-10-21T02:57:03.594"/>
+    </inkml:context>
+    <inkml:brush xml:id="br0">
+      <inkml:brushProperty name="width" value="0.3" units="cm"/>
+      <inkml:brushProperty name="height" value="0.6" units="cm"/>
+      <inkml:brushProperty name="color" value="#FFFC00"/>
+      <inkml:brushProperty name="tip" value="rectangle"/>
+      <inkml:brushProperty name="rasterOp" value="maskPen"/>
+    </inkml:brush>
+  </inkml:definitions>
+  <inkml:trace contextRef="#ctx0" brushRef="#br0">0 1,'54'44,"0"0,7 3,7 6,6 3,-11-8,4 2,3 3,3 1,1 0,-5-2,3 0,2 2,0 0,1 0,0 0,3 2,0 1,2-1,-1 1,-2-2,-1-1,5 2,-1 0,-1-2,-3-1,-3-3,0-1,-3-2,-3-2,-4-3,1 0,-4-3,-6-5,-5-3,-6-4,7 2,-32-19,-11-8,-5-2</inkml:trace>
+</inkml:ink>
+</file>
+
+<file path=ppt/ink/ink26.xml><?xml version="1.0" encoding="utf-8"?>
+<inkml:ink xmlns:inkml="http://www.w3.org/2003/InkML">
+  <inkml:definitions>
+    <inkml:context xml:id="ctx0">
+      <inkml:inkSource xml:id="inkSrc0">
+        <inkml:traceFormat>
+          <inkml:channel name="X" type="integer" min="-2.14748E9" max="2.14748E9" units="cm"/>
+          <inkml:channel name="Y" type="integer" min="-2.14748E9" max="2.14748E9" units="cm"/>
+        </inkml:traceFormat>
+        <inkml:channelProperties>
+          <inkml:channelProperty channel="X" name="resolution" value="1000" units="1/cm"/>
+          <inkml:channelProperty channel="Y" name="resolution" value="1000" units="1/cm"/>
+        </inkml:channelProperties>
+      </inkml:inkSource>
+      <inkml:timestamp xml:id="ts0" timeString="2025-10-21T02:57:04.160"/>
+    </inkml:context>
+    <inkml:brush xml:id="br0">
+      <inkml:brushProperty name="width" value="0.3" units="cm"/>
+      <inkml:brushProperty name="height" value="0.6" units="cm"/>
+      <inkml:brushProperty name="color" value="#FFFC00"/>
+      <inkml:brushProperty name="tip" value="rectangle"/>
+      <inkml:brushProperty name="rasterOp" value="maskPen"/>
+    </inkml:brush>
+  </inkml:definitions>
+  <inkml:trace contextRef="#ctx0" brushRef="#br0">1486 1,'-47'60,"-1"1,1-1,4-3,-2 2,-1 3,-2 3,-3 2,-1 4,-3 3,0 2,0-1,4-5,0 1,0 1,-1 0,2-1,1-1,-3 5,1-1,1-1,2-1,1-2,-5 7,2-1,3-4,4-5,-11 22,11-15,10-15,15-23,17-39</inkml:trace>
+</inkml:ink>
+</file>
+
+<file path=ppt/ink/ink27.xml><?xml version="1.0" encoding="utf-8"?>
+<inkml:ink xmlns:inkml="http://www.w3.org/2003/InkML">
+  <inkml:definitions>
+    <inkml:context xml:id="ctx0">
+      <inkml:inkSource xml:id="inkSrc0">
+        <inkml:traceFormat>
+          <inkml:channel name="X" type="integer" min="-2.14748E9" max="2.14748E9" units="cm"/>
+          <inkml:channel name="Y" type="integer" min="-2.14748E9" max="2.14748E9" units="cm"/>
+        </inkml:traceFormat>
+        <inkml:channelProperties>
+          <inkml:channelProperty channel="X" name="resolution" value="1000" units="1/cm"/>
+          <inkml:channelProperty channel="Y" name="resolution" value="1000" units="1/cm"/>
+        </inkml:channelProperties>
+      </inkml:inkSource>
+      <inkml:timestamp xml:id="ts0" timeString="2025-10-21T03:00:31.716"/>
+    </inkml:context>
+    <inkml:brush xml:id="br0">
+      <inkml:brushProperty name="width" value="0.3" units="cm"/>
+      <inkml:brushProperty name="height" value="0.6" units="cm"/>
+      <inkml:brushProperty name="color" value="#FFFC00"/>
+      <inkml:brushProperty name="tip" value="rectangle"/>
+      <inkml:brushProperty name="rasterOp" value="maskPen"/>
+    </inkml:brush>
+  </inkml:definitions>
+  <inkml:trace contextRef="#ctx0" brushRef="#br0">2095 247,'-96'0,"24"0,-6 0,-13-1,-3 2,22 0,-3 2,1 3,1 2,0 3,2 4,4 4,3 5,1 3,-1 6,2 5,2 3,1 5,3 4,1 3,0 5,2 2,3 2,0 4,3 1,2 1,3 1,1 2,3-1,3-3,3 0,2-1,4-2,1-1,4 0,-7 29,6 0,4-3,6 1,6 2,8-2,9 0,12-3,12 0,14-2,0-23,7-2,7-2,-3-10,4-1,4-1,3-2,11 4,4-2,3-2,2-1,-12-7,2-2,1-1,2-1,1-2,5-1,1-2,1-2,2-1,-1-2,4-2,1-1,0-2,1-2,-1-2,-2-2,1-1,-1-3,0-2,-1-2,-3-4,0-1,0-3,-2-2,-2-4,-6-3,-1-2,-1-2,-2-4,-1-3,12-8,-3-5,-1-4,-2-5,-16 4,-1-3,-2-4,-1-1,-3-2,12-15,-4-2,-2-4,-4-2,-3-3,-4-3,-3-2,-3-1,-5-2,-3-1,-4-2,-4 0,-6 3,-4 0,-3-1,-4 0,-2 2,-4 0,-3 0,-6 2,-5 5,-4 1,-5 1,-5 3,-13-19,-8 3,-8 5,-9 5,-9 5,-5 6,12 18,-3 4,-4 2,-3 4,-10 0,-4 3,-4 3,-1 4,11 8,-2 1,-1 4,-2 1,-1 2,-7 2,-1 2,-2 3,0 2,0 3,-2 2,-2 4,0 1,1 3,2 2,7 2,1 2,0 2,3 2,1 0,-11 5,2 1,3 2,4 1,-6 5,5 2,6-2,-7 5,11-2,-13 14,53-26,27-11</inkml:trace>
+</inkml:ink>
+</file>
+
+<file path=ppt/ink/ink28.xml><?xml version="1.0" encoding="utf-8"?>
+<inkml:ink xmlns:inkml="http://www.w3.org/2003/InkML">
+  <inkml:definitions>
+    <inkml:context xml:id="ctx0">
+      <inkml:inkSource xml:id="inkSrc0">
+        <inkml:traceFormat>
+          <inkml:channel name="X" type="integer" min="-2.14748E9" max="2.14748E9" units="cm"/>
+          <inkml:channel name="Y" type="integer" min="-2.14748E9" max="2.14748E9" units="cm"/>
+        </inkml:traceFormat>
+        <inkml:channelProperties>
+          <inkml:channelProperty channel="X" name="resolution" value="1000" units="1/cm"/>
+          <inkml:channelProperty channel="Y" name="resolution" value="1000" units="1/cm"/>
+        </inkml:channelProperties>
+      </inkml:inkSource>
+      <inkml:timestamp xml:id="ts0" timeString="2025-10-21T03:00:33.084"/>
+    </inkml:context>
+    <inkml:brush xml:id="br0">
+      <inkml:brushProperty name="width" value="0.3" units="cm"/>
+      <inkml:brushProperty name="height" value="0.6" units="cm"/>
+      <inkml:brushProperty name="color" value="#FFFC00"/>
+      <inkml:brushProperty name="tip" value="rectangle"/>
+      <inkml:brushProperty name="rasterOp" value="maskPen"/>
+    </inkml:brush>
+  </inkml:definitions>
+  <inkml:trace contextRef="#ctx0" brushRef="#br0">2920 293,'-97'-4,"-1"0,8 4,-6 1,-4 3,13 2,-3 3,-2 2,-2 3,7 2,-2 3,-2 1,0 4,1 1,10 0,-1 1,0 2,1 2,1 1,3 1,-9 6,3 2,1 1,2 2,3 2,-11 9,3 2,4 2,6 2,13-5,3 1,6 2,7 3,-1 18,9 3,6 3,4 5,7 3,3 0,5 0,5 2,2-1,2-3,2-1,1-1,0-6,-1-1,3-2,0-6,2-2,4-1,4-4,3-2,5-1,20 26,12-6,-8-29,5-4,7-3,16 2,8-4,6-5,-7-9,5-4,4-3,2-3,-9-3,2-2,3-3,2 0,1-2,-5-2,3-1,1-2,1 0,1-3,-1 0,2-3,0-1,2-1,-2-3,1 0,-2-3,-5 0,0-2,-1-2,0-1,-2-2,-1-2,10-4,0-3,-3-2,-2-3,-5-4,5-7,-4-4,-5-5,-6-4,-8-3,-5-3,-5-5,-5-3,-5-7,-4-4,-6-3,-5-5,-8 6,-3-3,-5-3,-4-3,-2-1,-4 5,-3-3,-3-1,-2-1,-3-1,-2 2,-2-2,-3 0,-2 0,-2 0,-3 2,-3 1,-2 1,-2 1,-2 1,-3 2,-2 2,-2 4,-7-4,-2 4,-3 2,-1 5,-1 5,-5 1,-2 5,0 5,-1 6,-8-2,-1 7,5 9,-4 7,7 9,-7 6,39 10</inkml:trace>
+</inkml:ink>
+</file>
+
+<file path=ppt/ink/ink29.xml><?xml version="1.0" encoding="utf-8"?>
+<inkml:ink xmlns:inkml="http://www.w3.org/2003/InkML">
+  <inkml:definitions>
+    <inkml:context xml:id="ctx0">
+      <inkml:inkSource xml:id="inkSrc0">
+        <inkml:traceFormat>
+          <inkml:channel name="X" type="integer" min="-2.14748E9" max="2.14748E9" units="cm"/>
+          <inkml:channel name="Y" type="integer" min="-2.14748E9" max="2.14748E9" units="cm"/>
+        </inkml:traceFormat>
+        <inkml:channelProperties>
+          <inkml:channelProperty channel="X" name="resolution" value="1000" units="1/cm"/>
+          <inkml:channelProperty channel="Y" name="resolution" value="1000" units="1/cm"/>
+        </inkml:channelProperties>
+      </inkml:inkSource>
+      <inkml:timestamp xml:id="ts0" timeString="2025-10-21T03:00:34.252"/>
+    </inkml:context>
+    <inkml:brush xml:id="br0">
+      <inkml:brushProperty name="width" value="0.3" units="cm"/>
+      <inkml:brushProperty name="height" value="0.6" units="cm"/>
+      <inkml:brushProperty name="color" value="#FFFC00"/>
+      <inkml:brushProperty name="tip" value="rectangle"/>
+      <inkml:brushProperty name="rasterOp" value="maskPen"/>
+    </inkml:brush>
+  </inkml:definitions>
+  <inkml:trace contextRef="#ctx0" brushRef="#br0">1 1,'43'66,"0"0,2-3,3 4,4 3,-4-8,3 3,2 0,1 2,6 5,1 2,1 0,0-1,-1-2,1 1,-1-2,-1-3,-7-8,-1-3,0 0,-2-2,13 15,-2-2,-3-2,-9-10,-3-3,-2 0,9 13,-5-4,-12-13,-5-4,6 9,-16-28,-12-15,-5-9</inkml:trace>
+</inkml:ink>
+</file>
+
 <file path=ppt/ink/ink3.xml><?xml version="1.0" encoding="utf-8"?>
 <inkml:ink xmlns:inkml="http://www.w3.org/2003/InkML">
   <inkml:definitions>
@@ -307,6 +789,90 @@
     </inkml:brush>
   </inkml:definitions>
   <inkml:trace contextRef="#ctx0" brushRef="#br0">2651 906 24575,'-28'-3'0,"-34"0"0,10 3 0,-6 0 0,-17 0 0,-5 0 0,-12 0 0,-3 0 0,-3 0 0,0 0 0,32 0 0,-1 0 0,0 0-243,0 0 1,-1 1-1,1 1 243,-31 4 0,1 4 0,1 6 0,2 6 0,5 7 0,3 7 0,4 7 0,4 4 0,2 4 0,3 2 90,5 1 0,2 0-90,5 0 0,2 0 0,3 1 0,3 2 0,6-2 0,3 1 0,5 1 0,5 1 0,4-2 0,6 1 274,6-2 0,4 0-274,3 4 0,3 2 0,3 2 0,2 2 0,1 3 0,5 2 0,4 3 0,5 0 0,7 2 0,6-1 0,6 0 0,7-2 0,6 0 0,4-2 0,5-2 0,2-2 0,5-1 0,5-1 0,7 0 0,4-1-172,-20-21 0,1-2 0,3 0 172,6 1 0,2-1 0,3-2-310,5 1 0,4-2 0,1-2 310,6 0 0,2-3 0,2-1 0,-20-9 0,1-1 0,2-2 0,0-1 0,1-1 0,2-2 0,0-1 0,2-1-491,8-2 1,1-1 0,2-2 0,1-3 490,5-1 0,3-2 0,0-2 0,2-4-487,-13 0 0,1-3 0,1-2 0,0-2 0,2-2 487,-11 0 0,2-1 0,0-3 0,0 0 0,1-2 0,-1-2-340,3-2 1,0-1 0,0-2 0,0-1-1,-1-1 1,0-1 339,0 0 0,-1 0 0,-1-2 0,1 0 0,-2-1 0,0 0 0,-2 0 0,-1-1 0,-1 0 0,0-1 0,-1 0 0,-1 0 0,10-6 0,-1 0 0,-1-1 0,-2 0 0,-1 1-164,-6 1 1,-3 1 0,0 0-1,-2-1 1,0 0 163,11-8 0,0-1 0,-3 0 0,-3 1 308,8-8 0,-3 2 0,-7-1-308,-13 8 0,-5 0 0,-4 0 0,11-18 0,-11-2 1057,-14 5 0,-8-3-1057,-6-3 0,-8-2 1420,-10-3 0,-10-2-1420,-13-5 0,-10-1 0,-12-8 0,-10-1 382,9 25 0,-4-1 0,-4 1-382,-5-4 0,-4 0 0,-2 1 0,-3-3 0,-3 1 0,-1 2-247,-4 0 1,-1 2-1,-1 1 247,-1 2 0,-2 2 0,-1 3 0,0 4 0,-1 2 0,-2 4 0,-1 3 0,-1 4 0,-1 3 0,-4 2 0,-1 2 0,-2 4 0,18 8 0,-2 2 0,0 1 0,-2 2 0,-6 1 0,-1 1 0,-2 2 0,-1 1-477,-9 1 1,-2 1 0,-1 1 0,-1 1 476,16 3 0,-2 0 0,0 0 0,0 1 0,0 1 0,-3 0 0,1 0 0,-1 1 0,0 0 0,1 0 0,0 0 0,1 0 0,1 0 0,-1 1 0,2 0 0,-17 0 0,1 1 0,1 0 0,0 1 0,5 1 0,1 2 0,1 0 0,1 2 0,5 1 0,2 2 0,1 1 0,2 1-200,-14 5 0,3 1 0,5 2 200,11 0 0,4 2 0,4-1 413,-13 7 1,7 1-414,20-6 0,6 1 1249,-23 21-1249,34 1 2079,19 15-2079,12 16 761,10 21-761,3-44 0,2 0 0,4-1 0,2-1 0,19 39 0,-3-26 0,-9-24 0,-11-24 0,-6-10 0</inkml:trace>
+</inkml:ink>
+</file>
+
+<file path=ppt/ink/ink30.xml><?xml version="1.0" encoding="utf-8"?>
+<inkml:ink xmlns:inkml="http://www.w3.org/2003/InkML">
+  <inkml:definitions>
+    <inkml:context xml:id="ctx0">
+      <inkml:inkSource xml:id="inkSrc0">
+        <inkml:traceFormat>
+          <inkml:channel name="X" type="integer" min="-2.14748E9" max="2.14748E9" units="cm"/>
+          <inkml:channel name="Y" type="integer" min="-2.14748E9" max="2.14748E9" units="cm"/>
+        </inkml:traceFormat>
+        <inkml:channelProperties>
+          <inkml:channelProperty channel="X" name="resolution" value="1000" units="1/cm"/>
+          <inkml:channelProperty channel="Y" name="resolution" value="1000" units="1/cm"/>
+        </inkml:channelProperties>
+      </inkml:inkSource>
+      <inkml:timestamp xml:id="ts0" timeString="2025-10-21T03:00:35.087"/>
+    </inkml:context>
+    <inkml:brush xml:id="br0">
+      <inkml:brushProperty name="width" value="0.3" units="cm"/>
+      <inkml:brushProperty name="height" value="0.6" units="cm"/>
+      <inkml:brushProperty name="color" value="#FFFC00"/>
+      <inkml:brushProperty name="tip" value="rectangle"/>
+      <inkml:brushProperty name="rasterOp" value="maskPen"/>
+    </inkml:brush>
+  </inkml:definitions>
+  <inkml:trace contextRef="#ctx0" brushRef="#br0">3531 0,'-63'59,"0"1,0-1,0 0,0 0,1 0,-2 2,-2 3,-2 1,-1 3,-1 1,-2 3,10-10,-2 2,-2 2,0 1,-1 2,-1 0,0 1,0 1,0-1,1 0,3-4,1 1,-1 1,-1-1,1 2,0-1,0 0,1 1,1-1,0-1,1 0,-1 3,0-1,0 1,0 0,2-1,0 0,2-1,1-1,1-2,2-1,-8 10,1 0,2-2,2-1,2-2,3-3,3-2,-12 17,4-3,5-4,4-6,5-5,4-5,6-7,-15 29,33-53,15-23,3-10</inkml:trace>
+</inkml:ink>
+</file>
+
+<file path=ppt/ink/ink31.xml><?xml version="1.0" encoding="utf-8"?>
+<inkml:ink xmlns:inkml="http://www.w3.org/2003/InkML">
+  <inkml:definitions>
+    <inkml:context xml:id="ctx0">
+      <inkml:inkSource xml:id="inkSrc0">
+        <inkml:traceFormat>
+          <inkml:channel name="X" type="integer" min="-2.14748E9" max="2.14748E9" units="cm"/>
+          <inkml:channel name="Y" type="integer" min="-2.14748E9" max="2.14748E9" units="cm"/>
+        </inkml:traceFormat>
+        <inkml:channelProperties>
+          <inkml:channelProperty channel="X" name="resolution" value="1000" units="1/cm"/>
+          <inkml:channelProperty channel="Y" name="resolution" value="1000" units="1/cm"/>
+        </inkml:channelProperties>
+      </inkml:inkSource>
+      <inkml:timestamp xml:id="ts0" timeString="2025-10-21T03:03:40.039"/>
+    </inkml:context>
+    <inkml:brush xml:id="br0">
+      <inkml:brushProperty name="width" value="0.3" units="cm"/>
+      <inkml:brushProperty name="height" value="0.6" units="cm"/>
+      <inkml:brushProperty name="color" value="#FFFC00"/>
+      <inkml:brushProperty name="tip" value="rectangle"/>
+      <inkml:brushProperty name="rasterOp" value="maskPen"/>
+    </inkml:brush>
+  </inkml:definitions>
+  <inkml:trace contextRef="#ctx0" brushRef="#br0">0 0,'0'95,"0"-1,0-22,0 3,0 3,0-6,0 3,0 2,0 3,0 12,0 4,0 2,0 1,0-13,0 1,0 1,0 1,0 2,0-8,0 1,0 2,0 0,0 2,0 0,0-4,0 0,0 2,0 0,0 1,0 1,0-1,0 6,0 1,0 1,0 0,0 0,0 0,0 0,0 0,0 1,0-1,0 1,0-1,0 0,0-1,0-4,0-1,0 1,0-2,0 0,0 0,0-1,0 9,0-1,0 0,0-1,0 0,0-1,0-5,0 0,0-1,0 0,0 0,0 0,0 3,0 0,0 0,0 0,0 1,0-2,0-2,0 1,0-1,0 0,0-1,0-1,0 15,0-2,0 0,0-1,0-1,0-3,0 0,0-1,0-2,0-2,0 10,0-2,0-3,0-2,0-10,0-2,0-2,0-3,0 7,0-3,0-4,0 17,0-4,1-4,2-2,0-4,2-1,3 1,0 0,4 5,0 1,1 1,0 1,-1 3,-2 0,-1 0,-2 0,-3-2,-1-2,-2-6,-1-2,0-11,0-4,0 32,0-34,0-31,0-14</inkml:trace>
+</inkml:ink>
+</file>
+
+<file path=ppt/ink/ink32.xml><?xml version="1.0" encoding="utf-8"?>
+<inkml:ink xmlns:inkml="http://www.w3.org/2003/InkML">
+  <inkml:definitions>
+    <inkml:context xml:id="ctx0">
+      <inkml:inkSource xml:id="inkSrc0">
+        <inkml:traceFormat>
+          <inkml:channel name="X" type="integer" min="-2.14748E9" max="2.14748E9" units="cm"/>
+          <inkml:channel name="Y" type="integer" min="-2.14748E9" max="2.14748E9" units="cm"/>
+        </inkml:traceFormat>
+        <inkml:channelProperties>
+          <inkml:channelProperty channel="X" name="resolution" value="1000" units="1/cm"/>
+          <inkml:channelProperty channel="Y" name="resolution" value="1000" units="1/cm"/>
+        </inkml:channelProperties>
+      </inkml:inkSource>
+      <inkml:timestamp xml:id="ts0" timeString="2025-10-21T03:03:42.407"/>
+    </inkml:context>
+    <inkml:brush xml:id="br0">
+      <inkml:brushProperty name="width" value="0.3" units="cm"/>
+      <inkml:brushProperty name="height" value="0.6" units="cm"/>
+      <inkml:brushProperty name="color" value="#FFFC00"/>
+      <inkml:brushProperty name="tip" value="rectangle"/>
+      <inkml:brushProperty name="rasterOp" value="maskPen"/>
+    </inkml:brush>
+  </inkml:definitions>
+  <inkml:trace contextRef="#ctx0" brushRef="#br0">0 10619,'68'0,"-1"0,8 0,8 0,10 0,-21 0,6 0,5 0,3 0,4 0,3 0,-13 0,3 0,2 0,3 0,2 0,1 0,2 0,2 0,1 0,-3 0,2 0,2 0,1 0,2 0,1 0,1 0,0 0,1 0,1 0,-1 0,-8 0,0-1,2 1,-1 0,2-1,-1 1,2-1,-1 1,1-1,0 0,1 0,-1 0,0 0,-3 0,0-1,0 1,1 0,0-1,0 1,1-1,-1 0,1 0,-1 0,1 0,-1 0,0-1,0 1,0-1,-1 0,1 0,0 0,0 0,0-1,0 1,0-1,-1 0,0 0,0 0,0 0,-2 0,1-1,2 0,0 0,-1 0,0 0,-1 0,1-1,-1 0,-1 0,1 0,-1 0,0 0,-1 0,1 0,3 0,0-1,0 0,-1 1,1-1,-1 0,-1 0,0 0,-1 0,-1 0,0 0,-2 0,7-1,0 1,-1-1,-1 1,-1-1,-1 0,-1 1,0 0,-2 0,-1 0,11 0,-1-1,-2 1,0 0,-2 1,-1-1,-2 1,0 0,1 1,0 0,-2 0,-1 0,-2 1,-2 0,-2 0,14 0,-2 1,-4 0,-1 1,-4 0,7 0,-4 0,-3 1,-3 1,8 0,-5 1,-4 1,16 2,-7 2,-16 2,-3 2,-10 2,-2 1,-10-1,-2 1,33 9,-26-9,-21-6,-16-6,-8-1,3 0,-9-47,-14-31,-8-22,5 29,-2-7,-2-7,-1-4,0-2,1 10,0-3,-2-3,1-2,-2-2,1-2,-1-1,3 8,-2-1,1-3,-1-1,0-1,0 0,0-1,0 1,0 0,0-1,0-1,0 0,-1-1,1 1,0-1,0 2,0 0,0 2,-1-5,0 1,0 1,0 0,0 1,0 1,0 1,1 2,-2-5,0 1,1 0,-1 2,1 2,0 2,0 2,-2-13,-1 3,1 2,0 2,1 2,-2-9,2 3,0 1,2 1,1 6,3 0,0 0,2 1,2 0,1 0,2 0,0-1,1-4,1 0,2-2,0 1,2-5,2 0,1 0,1 0,1-1,1 0,2 1,0 0,1 5,2 0,0 2,1 2,0 6,1 1,1 3,-1 1,2-10,0 2,-1 4,3-20,-2 6,-4 17,-3 5,-3 12,-1 4,-5-41,-16 15,-24 4,10 40,-6 1,-9-2,-4 0,-9-4,-2-1,-6-6,-1-3,-6-8,-1-4,23 18,0-2,0-1,-2-3,1-1,0-1,-1-1,-1-2,1 2,-2-2,0 1,-1 1,-1 1,-1 2,-3 1,-5 2,-1 2,-6 4,-11 2,-6 4,-5 5,14 9,-4 4,-3 3,-3 2,6 4,-4 1,-1 2,-4 2,-1 2,4 2,-3 2,-1 1,-2 1,-2 3,0 0,4 2,-1 1,-2 2,0 1,-2 1,0 1,-1 0,7 1,-1 0,-1 1,-1 2,0-1,0 2,0 0,0 1,8-2,1 2,-1 0,-1 1,1 0,0 0,1 1,0-1,0 0,-7 2,0 1,1 0,0-1,0 1,1-1,1 1,1-2,-6 2,1 0,1-1,1 0,0-1,2 0,0 0,-6 1,1 0,1-2,1 1,1-1,2-1,8-2,1 0,2-1,1 0,0-1,1 0,-11 2,1 0,1-1,1 0,1 0,5-1,0-1,2 1,0-1,0 0,-14 2,2 0,0 0,1 0,6-1,0 0,1-1,2 1,5-1,2-1,1 0,2 0,-13 2,3 0,3-1,10-2,3-1,1 0,-23 4,4-2,9 0,2-1,-4 0,-1 0,0 0,0 0,3-2,0-1,-2 0,-1-2,1-1,1-2,-1-1,1-1,2 1,1-2,6 0,1-2,9-3,1-3,-41-14,8-9,16-4,14 3,14 6,14 6,11 5,10 8,6 1</inkml:trace>
 </inkml:ink>
 </file>
 
@@ -554,7 +1120,7 @@
           <a:p>
             <a:fld id="{64AE9F07-5FA6-BA49-B825-7EA04045DFAA}" type="datetimeFigureOut">
               <a:rPr lang="en-US" smtClean="0"/>
-              <a:t>10/20/25</a:t>
+              <a:t>10/26/25</a:t>
             </a:fld>
             <a:endParaRPr lang="en-US"/>
           </a:p>
@@ -998,6 +1564,117 @@
 </p:notes>
 </file>
 
+<file path=ppt/notesSlides/notesSlide3.xml><?xml version="1.0" encoding="utf-8"?>
+<p:notes xmlns:a="http://schemas.openxmlformats.org/drawingml/2006/main" xmlns:r="http://schemas.openxmlformats.org/officeDocument/2006/relationships" xmlns:p="http://schemas.openxmlformats.org/presentationml/2006/main">
+  <p:cSld>
+    <p:spTree>
+      <p:nvGrpSpPr>
+        <p:cNvPr id="1" name=""/>
+        <p:cNvGrpSpPr/>
+        <p:nvPr/>
+      </p:nvGrpSpPr>
+      <p:grpSpPr>
+        <a:xfrm>
+          <a:off x="0" y="0"/>
+          <a:ext cx="0" cy="0"/>
+          <a:chOff x="0" y="0"/>
+          <a:chExt cx="0" cy="0"/>
+        </a:xfrm>
+      </p:grpSpPr>
+      <p:sp>
+        <p:nvSpPr>
+          <p:cNvPr id="2" name="Slide Image Placeholder 1"/>
+          <p:cNvSpPr>
+            <a:spLocks noGrp="1" noRot="1" noChangeAspect="1"/>
+          </p:cNvSpPr>
+          <p:nvPr>
+            <p:ph type="sldImg"/>
+          </p:nvPr>
+        </p:nvSpPr>
+        <p:spPr/>
+      </p:sp>
+      <p:sp>
+        <p:nvSpPr>
+          <p:cNvPr id="3" name="Notes Placeholder 2"/>
+          <p:cNvSpPr>
+            <a:spLocks noGrp="1"/>
+          </p:cNvSpPr>
+          <p:nvPr>
+            <p:ph type="body" idx="1"/>
+          </p:nvPr>
+        </p:nvSpPr>
+        <p:spPr/>
+        <p:txBody>
+          <a:bodyPr/>
+          <a:lstStyle/>
+          <a:p>
+            <a:r>
+              <a:rPr lang="en-US" dirty="0"/>
+              <a:t>https://</a:t>
+            </a:r>
+            <a:r>
+              <a:rPr lang="en-US" dirty="0" err="1"/>
+              <a:t>github.com</a:t>
+            </a:r>
+            <a:r>
+              <a:rPr lang="en-US" dirty="0"/>
+              <a:t>/</a:t>
+            </a:r>
+            <a:r>
+              <a:rPr lang="en-US" dirty="0" err="1"/>
+              <a:t>calmrocks</a:t>
+            </a:r>
+            <a:r>
+              <a:rPr lang="en-US" dirty="0"/>
+              <a:t>/system-design-dive-deep/tree/main/</a:t>
+            </a:r>
+            <a:r>
+              <a:rPr lang="en-US" dirty="0" err="1"/>
+              <a:t>rednote</a:t>
+            </a:r>
+            <a:r>
+              <a:rPr lang="en-US" dirty="0"/>
+              <a:t>-case-study/requirements</a:t>
+            </a:r>
+          </a:p>
+        </p:txBody>
+      </p:sp>
+      <p:sp>
+        <p:nvSpPr>
+          <p:cNvPr id="4" name="Slide Number Placeholder 3"/>
+          <p:cNvSpPr>
+            <a:spLocks noGrp="1"/>
+          </p:cNvSpPr>
+          <p:nvPr>
+            <p:ph type="sldNum" sz="quarter" idx="5"/>
+          </p:nvPr>
+        </p:nvSpPr>
+        <p:spPr/>
+        <p:txBody>
+          <a:bodyPr/>
+          <a:lstStyle/>
+          <a:p>
+            <a:fld id="{6C63DDBB-588D-E349-89FB-E97E419441EA}" type="slidenum">
+              <a:rPr lang="en-US" smtClean="0"/>
+              <a:t>35</a:t>
+            </a:fld>
+            <a:endParaRPr lang="en-US"/>
+          </a:p>
+        </p:txBody>
+      </p:sp>
+    </p:spTree>
+    <p:extLst>
+      <p:ext uri="{BB962C8B-B14F-4D97-AF65-F5344CB8AC3E}">
+        <p14:creationId xmlns:p14="http://schemas.microsoft.com/office/powerpoint/2010/main" val="1268120371"/>
+      </p:ext>
+    </p:extLst>
+  </p:cSld>
+  <p:clrMapOvr>
+    <a:masterClrMapping/>
+  </p:clrMapOvr>
+</p:notes>
+</file>
+
 <file path=ppt/slideLayouts/slideLayout1.xml><?xml version="1.0" encoding="utf-8"?>
 <p:sldLayout xmlns:a="http://schemas.openxmlformats.org/drawingml/2006/main" xmlns:r="http://schemas.openxmlformats.org/officeDocument/2006/relationships" xmlns:p="http://schemas.openxmlformats.org/presentationml/2006/main" type="title" preserve="1">
   <p:cSld name="Title Slide">
@@ -1286,7 +1963,7 @@
           <a:p>
             <a:fld id="{78ABE3C1-DBE1-495D-B57B-2849774B866A}" type="datetimeFigureOut">
               <a:rPr lang="en-US" smtClean="0"/>
-              <a:t>10/20/25</a:t>
+              <a:t>10/26/25</a:t>
             </a:fld>
             <a:endParaRPr lang="en-US" dirty="0"/>
           </a:p>
@@ -1700,7 +2377,7 @@
           <a:p>
             <a:fld id="{9D6E9DEC-419B-4CC5-A080-3B06BD5A8291}" type="datetimeFigureOut">
               <a:rPr lang="en-US" smtClean="0"/>
-              <a:t>10/20/25</a:t>
+              <a:t>10/26/25</a:t>
             </a:fld>
             <a:endParaRPr lang="en-US" dirty="0"/>
           </a:p>
@@ -2038,7 +2715,7 @@
           <a:p>
             <a:fld id="{9D6E9DEC-419B-4CC5-A080-3B06BD5A8291}" type="datetimeFigureOut">
               <a:rPr lang="en-US" smtClean="0"/>
-              <a:t>10/20/25</a:t>
+              <a:t>10/26/25</a:t>
             </a:fld>
             <a:endParaRPr lang="en-US" dirty="0"/>
           </a:p>
@@ -2445,7 +3122,7 @@
           <a:p>
             <a:fld id="{9D6E9DEC-419B-4CC5-A080-3B06BD5A8291}" type="datetimeFigureOut">
               <a:rPr lang="en-US" smtClean="0"/>
-              <a:t>10/20/25</a:t>
+              <a:t>10/26/25</a:t>
             </a:fld>
             <a:endParaRPr lang="en-US" dirty="0"/>
           </a:p>
@@ -3015,7 +3692,7 @@
           <a:p>
             <a:fld id="{9D6E9DEC-419B-4CC5-A080-3B06BD5A8291}" type="datetimeFigureOut">
               <a:rPr lang="en-US" smtClean="0"/>
-              <a:t>10/20/25</a:t>
+              <a:t>10/26/25</a:t>
             </a:fld>
             <a:endParaRPr lang="en-US" dirty="0"/>
           </a:p>
@@ -3698,7 +4375,7 @@
           <a:p>
             <a:fld id="{9D6E9DEC-419B-4CC5-A080-3B06BD5A8291}" type="datetimeFigureOut">
               <a:rPr lang="en-US" smtClean="0"/>
-              <a:t>10/20/25</a:t>
+              <a:t>10/26/25</a:t>
             </a:fld>
             <a:endParaRPr lang="en-US" dirty="0"/>
           </a:p>
@@ -4613,7 +5290,7 @@
           <a:p>
             <a:fld id="{9D6E9DEC-419B-4CC5-A080-3B06BD5A8291}" type="datetimeFigureOut">
               <a:rPr lang="en-US" smtClean="0"/>
-              <a:t>10/20/25</a:t>
+              <a:t>10/26/25</a:t>
             </a:fld>
             <a:endParaRPr lang="en-US" dirty="0"/>
           </a:p>
@@ -4928,7 +5605,7 @@
           <a:p>
             <a:fld id="{9D6E9DEC-419B-4CC5-A080-3B06BD5A8291}" type="datetimeFigureOut">
               <a:rPr lang="en-US" smtClean="0"/>
-              <a:t>10/20/25</a:t>
+              <a:t>10/26/25</a:t>
             </a:fld>
             <a:endParaRPr lang="en-US" dirty="0"/>
           </a:p>
@@ -5194,7 +5871,7 @@
           <a:p>
             <a:fld id="{9D6E9DEC-419B-4CC5-A080-3B06BD5A8291}" type="datetimeFigureOut">
               <a:rPr lang="en-US" smtClean="0"/>
-              <a:t>10/20/25</a:t>
+              <a:t>10/26/25</a:t>
             </a:fld>
             <a:endParaRPr lang="en-US" dirty="0"/>
           </a:p>
@@ -5388,6 +6065,13 @@
             <a:schemeClr val="lt1"/>
           </a:fontRef>
         </p:style>
+        <p:txBody>
+          <a:bodyPr/>
+          <a:lstStyle/>
+          <a:p>
+            <a:endParaRPr lang="en-US"/>
+          </a:p>
+        </p:txBody>
       </p:sp>
       <p:sp>
         <p:nvSpPr>
@@ -5426,22 +6110,29 @@
             <a:schemeClr val="lt1"/>
           </a:fontRef>
         </p:style>
-      </p:sp>
-      <p:sp>
-        <p:nvSpPr>
-          <p:cNvPr id="2" name="Title 1"/>
-          <p:cNvSpPr>
-            <a:spLocks noGrp="1"/>
-          </p:cNvSpPr>
-          <p:nvPr>
-            <p:ph type="title"/>
-          </p:nvPr>
-        </p:nvSpPr>
-        <p:spPr/>
         <p:txBody>
           <a:bodyPr/>
           <a:lstStyle/>
           <a:p>
+            <a:endParaRPr lang="en-US"/>
+          </a:p>
+        </p:txBody>
+      </p:sp>
+      <p:sp>
+        <p:nvSpPr>
+          <p:cNvPr id="2" name="Title 1"/>
+          <p:cNvSpPr>
+            <a:spLocks noGrp="1"/>
+          </p:cNvSpPr>
+          <p:nvPr>
+            <p:ph type="title"/>
+          </p:nvPr>
+        </p:nvSpPr>
+        <p:spPr/>
+        <p:txBody>
+          <a:bodyPr/>
+          <a:lstStyle/>
+          <a:p>
             <a:r>
               <a:rPr lang="en-US"/>
               <a:t>Click to edit Master title style</a:t>
@@ -5519,7 +6210,7 @@
           <a:p>
             <a:fld id="{9D6E9DEC-419B-4CC5-A080-3B06BD5A8291}" type="datetimeFigureOut">
               <a:rPr lang="en-US" smtClean="0"/>
-              <a:t>10/20/25</a:t>
+              <a:t>10/26/25</a:t>
             </a:fld>
             <a:endParaRPr lang="en-US" dirty="0"/>
           </a:p>
@@ -5910,7 +6601,7 @@
           <a:p>
             <a:fld id="{30578ACC-22D6-47C1-A373-4FD133E34F3C}" type="datetimeFigureOut">
               <a:rPr lang="en-US" smtClean="0"/>
-              <a:t>10/20/25</a:t>
+              <a:t>10/26/25</a:t>
             </a:fld>
             <a:endParaRPr lang="en-US" dirty="0"/>
           </a:p>
@@ -6286,7 +6977,7 @@
           <a:p>
             <a:fld id="{9D6E9DEC-419B-4CC5-A080-3B06BD5A8291}" type="datetimeFigureOut">
               <a:rPr lang="en-US" smtClean="0"/>
-              <a:t>10/20/25</a:t>
+              <a:t>10/26/25</a:t>
             </a:fld>
             <a:endParaRPr lang="en-US" dirty="0"/>
           </a:p>
@@ -6794,7 +7485,7 @@
           <a:p>
             <a:fld id="{9D6E9DEC-419B-4CC5-A080-3B06BD5A8291}" type="datetimeFigureOut">
               <a:rPr lang="en-US" smtClean="0"/>
-              <a:t>10/20/25</a:t>
+              <a:t>10/26/25</a:t>
             </a:fld>
             <a:endParaRPr lang="en-US" dirty="0"/>
           </a:p>
@@ -7053,7 +7744,7 @@
           <a:p>
             <a:fld id="{CE99F462-093F-4566-844B-4C71F2739DA5}" type="datetimeFigureOut">
               <a:rPr lang="en-US" smtClean="0"/>
-              <a:t>10/20/25</a:t>
+              <a:t>10/26/25</a:t>
             </a:fld>
             <a:endParaRPr lang="en-US" dirty="0"/>
           </a:p>
@@ -7216,7 +7907,7 @@
           <a:p>
             <a:fld id="{3D24A7AC-904D-4781-85BA-7D10C17ED021}" type="datetimeFigureOut">
               <a:rPr lang="en-US" smtClean="0"/>
-              <a:t>10/20/25</a:t>
+              <a:t>10/26/25</a:t>
             </a:fld>
             <a:endParaRPr lang="en-US" dirty="0"/>
           </a:p>
@@ -7606,7 +8297,7 @@
           <a:p>
             <a:fld id="{9D6E9DEC-419B-4CC5-A080-3B06BD5A8291}" type="datetimeFigureOut">
               <a:rPr lang="en-US" smtClean="0"/>
-              <a:t>10/20/25</a:t>
+              <a:t>10/26/25</a:t>
             </a:fld>
             <a:endParaRPr lang="en-US" dirty="0"/>
           </a:p>
@@ -8017,7 +8708,7 @@
           <a:p>
             <a:fld id="{363EFA5E-FA76-400D-B3DC-F0BA90E6D107}" type="datetimeFigureOut">
               <a:rPr lang="en-US" smtClean="0"/>
-              <a:t>10/20/25</a:t>
+              <a:t>10/26/25</a:t>
             </a:fld>
             <a:endParaRPr lang="en-US" dirty="0"/>
           </a:p>
@@ -8261,7 +8952,7 @@
           <a:p>
             <a:fld id="{9D6E9DEC-419B-4CC5-A080-3B06BD5A8291}" type="datetimeFigureOut">
               <a:rPr lang="en-US" smtClean="0"/>
-              <a:t>10/20/25</a:t>
+              <a:t>10/26/25</a:t>
             </a:fld>
             <a:endParaRPr lang="en-US" dirty="0"/>
           </a:p>
@@ -10697,7 +11388,7 @@
           <a:p>
             <a:r>
               <a:rPr lang="en-US" dirty="0"/>
-              <a:t>Maintainability</a:t>
+              <a:t>Operation</a:t>
             </a:r>
           </a:p>
         </p:txBody>
@@ -10769,7 +11460,13 @@
   <p:cSld>
     <p:spTree>
       <p:nvGrpSpPr>
-        <p:cNvPr id="1" name=""/>
+        <p:cNvPr id="1" name="">
+          <a:extLst>
+            <a:ext uri="{FF2B5EF4-FFF2-40B4-BE49-F238E27FC236}">
+              <a16:creationId xmlns:a16="http://schemas.microsoft.com/office/drawing/2014/main" id="{12C530CB-DC9F-72D2-39C3-239DA45BE69A}"/>
+            </a:ext>
+          </a:extLst>
+        </p:cNvPr>
         <p:cNvGrpSpPr/>
         <p:nvPr/>
       </p:nvGrpSpPr>
@@ -10786,7 +11483,7 @@
           <p:cNvPr id="2" name="Title 1">
             <a:extLst>
               <a:ext uri="{FF2B5EF4-FFF2-40B4-BE49-F238E27FC236}">
-                <a16:creationId xmlns:a16="http://schemas.microsoft.com/office/drawing/2014/main" id="{3D2A8675-5E2F-2DD2-967F-6491B3F607C9}"/>
+                <a16:creationId xmlns:a16="http://schemas.microsoft.com/office/drawing/2014/main" id="{FC0AF4DC-2CCE-A5CA-6274-AC2A6A7CC43B}"/>
               </a:ext>
             </a:extLst>
           </p:cNvPr>
@@ -10804,7 +11501,7 @@
           <a:p>
             <a:r>
               <a:rPr lang="en-US" dirty="0"/>
-              <a:t>Performance</a:t>
+              <a:t>Maintainability</a:t>
             </a:r>
           </a:p>
         </p:txBody>
@@ -10814,7 +11511,7 @@
           <p:cNvPr id="3" name="Content Placeholder 2">
             <a:extLst>
               <a:ext uri="{FF2B5EF4-FFF2-40B4-BE49-F238E27FC236}">
-                <a16:creationId xmlns:a16="http://schemas.microsoft.com/office/drawing/2014/main" id="{9935B0DD-7376-BA47-9B41-D6EED101AAE8}"/>
+                <a16:creationId xmlns:a16="http://schemas.microsoft.com/office/drawing/2014/main" id="{828E81DF-25F1-BBE7-449A-67A40C45BA82}"/>
               </a:ext>
             </a:extLst>
           </p:cNvPr>
@@ -10832,25 +11529,25 @@
           <a:p>
             <a:r>
               <a:rPr lang="en-US" dirty="0"/>
-              <a:t>Maintains user experience during growth</a:t>
-            </a:r>
-          </a:p>
-          <a:p>
-            <a:r>
-              <a:rPr lang="en-US" dirty="0"/>
-              <a:t>Adapts to increasing data volumes</a:t>
-            </a:r>
-          </a:p>
-          <a:p>
-            <a:r>
-              <a:rPr lang="en-US" dirty="0"/>
-              <a:t>Supports real-time business operations</a:t>
-            </a:r>
-          </a:p>
-          <a:p>
-            <a:r>
-              <a:rPr lang="en-US" dirty="0"/>
-              <a:t>Handles peak business periods</a:t>
+              <a:t>Facilitates quick business requirement changes</a:t>
+            </a:r>
+          </a:p>
+          <a:p>
+            <a:r>
+              <a:rPr lang="en-US" dirty="0"/>
+              <a:t>Enables rapid feature deployment</a:t>
+            </a:r>
+          </a:p>
+          <a:p>
+            <a:r>
+              <a:rPr lang="en-US" dirty="0"/>
+              <a:t>Supports easy system updates</a:t>
+            </a:r>
+          </a:p>
+          <a:p>
+            <a:r>
+              <a:rPr lang="en-US" dirty="0"/>
+              <a:t>Reduces technical debt</a:t>
             </a:r>
           </a:p>
           <a:p>
@@ -10861,7 +11558,7 @@
     </p:spTree>
     <p:extLst>
       <p:ext uri="{BB962C8B-B14F-4D97-AF65-F5344CB8AC3E}">
-        <p14:creationId xmlns:p14="http://schemas.microsoft.com/office/powerpoint/2010/main" val="2113106342"/>
+        <p14:creationId xmlns:p14="http://schemas.microsoft.com/office/powerpoint/2010/main" val="1894773636"/>
       </p:ext>
     </p:extLst>
   </p:cSld>
@@ -10893,7 +11590,7 @@
           <p:cNvPr id="2" name="Title 1">
             <a:extLst>
               <a:ext uri="{FF2B5EF4-FFF2-40B4-BE49-F238E27FC236}">
-                <a16:creationId xmlns:a16="http://schemas.microsoft.com/office/drawing/2014/main" id="{17F6346C-3680-FC88-AA05-62E93DDCA339}"/>
+                <a16:creationId xmlns:a16="http://schemas.microsoft.com/office/drawing/2014/main" id="{3D2A8675-5E2F-2DD2-967F-6491B3F607C9}"/>
               </a:ext>
             </a:extLst>
           </p:cNvPr>
@@ -10911,7 +11608,7 @@
           <a:p>
             <a:r>
               <a:rPr lang="en-US" dirty="0"/>
-              <a:t>Security</a:t>
+              <a:t>Performance</a:t>
             </a:r>
           </a:p>
         </p:txBody>
@@ -10921,7 +11618,7 @@
           <p:cNvPr id="3" name="Content Placeholder 2">
             <a:extLst>
               <a:ext uri="{FF2B5EF4-FFF2-40B4-BE49-F238E27FC236}">
-                <a16:creationId xmlns:a16="http://schemas.microsoft.com/office/drawing/2014/main" id="{7A2FC95E-3D2B-FA7C-751E-569FC66B6A0A}"/>
+                <a16:creationId xmlns:a16="http://schemas.microsoft.com/office/drawing/2014/main" id="{9935B0DD-7376-BA47-9B41-D6EED101AAE8}"/>
               </a:ext>
             </a:extLst>
           </p:cNvPr>
@@ -10939,25 +11636,25 @@
           <a:p>
             <a:r>
               <a:rPr lang="en-US" dirty="0"/>
-              <a:t>Protects expanding business assets</a:t>
-            </a:r>
-          </a:p>
-          <a:p>
-            <a:r>
-              <a:rPr lang="en-US" dirty="0"/>
-              <a:t>Adapts to new security threats</a:t>
-            </a:r>
-          </a:p>
-          <a:p>
-            <a:r>
-              <a:rPr lang="en-US" dirty="0"/>
-              <a:t>Supports compliance with changing regulations</a:t>
-            </a:r>
-          </a:p>
-          <a:p>
-            <a:r>
-              <a:rPr lang="en-US" dirty="0"/>
-              <a:t>Maintains trust as business grows</a:t>
+              <a:t>Maintains user experience during growth</a:t>
+            </a:r>
+          </a:p>
+          <a:p>
+            <a:r>
+              <a:rPr lang="en-US" dirty="0"/>
+              <a:t>Adapts to increasing data volumes</a:t>
+            </a:r>
+          </a:p>
+          <a:p>
+            <a:r>
+              <a:rPr lang="en-US" dirty="0"/>
+              <a:t>Supports real-time business operations</a:t>
+            </a:r>
+          </a:p>
+          <a:p>
+            <a:r>
+              <a:rPr lang="en-US" dirty="0"/>
+              <a:t>Handles peak business periods</a:t>
             </a:r>
           </a:p>
           <a:p>
@@ -10968,7 +11665,7 @@
     </p:spTree>
     <p:extLst>
       <p:ext uri="{BB962C8B-B14F-4D97-AF65-F5344CB8AC3E}">
-        <p14:creationId xmlns:p14="http://schemas.microsoft.com/office/powerpoint/2010/main" val="1800710920"/>
+        <p14:creationId xmlns:p14="http://schemas.microsoft.com/office/powerpoint/2010/main" val="2113106342"/>
       </p:ext>
     </p:extLst>
   </p:cSld>
@@ -11000,6 +11697,113 @@
           <p:cNvPr id="2" name="Title 1">
             <a:extLst>
               <a:ext uri="{FF2B5EF4-FFF2-40B4-BE49-F238E27FC236}">
+                <a16:creationId xmlns:a16="http://schemas.microsoft.com/office/drawing/2014/main" id="{17F6346C-3680-FC88-AA05-62E93DDCA339}"/>
+              </a:ext>
+            </a:extLst>
+          </p:cNvPr>
+          <p:cNvSpPr>
+            <a:spLocks noGrp="1"/>
+          </p:cNvSpPr>
+          <p:nvPr>
+            <p:ph type="title"/>
+          </p:nvPr>
+        </p:nvSpPr>
+        <p:spPr/>
+        <p:txBody>
+          <a:bodyPr/>
+          <a:lstStyle/>
+          <a:p>
+            <a:r>
+              <a:rPr lang="en-US" dirty="0"/>
+              <a:t>Security</a:t>
+            </a:r>
+          </a:p>
+        </p:txBody>
+      </p:sp>
+      <p:sp>
+        <p:nvSpPr>
+          <p:cNvPr id="3" name="Content Placeholder 2">
+            <a:extLst>
+              <a:ext uri="{FF2B5EF4-FFF2-40B4-BE49-F238E27FC236}">
+                <a16:creationId xmlns:a16="http://schemas.microsoft.com/office/drawing/2014/main" id="{7A2FC95E-3D2B-FA7C-751E-569FC66B6A0A}"/>
+              </a:ext>
+            </a:extLst>
+          </p:cNvPr>
+          <p:cNvSpPr>
+            <a:spLocks noGrp="1"/>
+          </p:cNvSpPr>
+          <p:nvPr>
+            <p:ph idx="1"/>
+          </p:nvPr>
+        </p:nvSpPr>
+        <p:spPr/>
+        <p:txBody>
+          <a:bodyPr/>
+          <a:lstStyle/>
+          <a:p>
+            <a:r>
+              <a:rPr lang="en-US" dirty="0"/>
+              <a:t>Protects expanding business assets</a:t>
+            </a:r>
+          </a:p>
+          <a:p>
+            <a:r>
+              <a:rPr lang="en-US" dirty="0"/>
+              <a:t>Adapts to new security threats</a:t>
+            </a:r>
+          </a:p>
+          <a:p>
+            <a:r>
+              <a:rPr lang="en-US" dirty="0"/>
+              <a:t>Supports compliance with changing regulations</a:t>
+            </a:r>
+          </a:p>
+          <a:p>
+            <a:r>
+              <a:rPr lang="en-US" dirty="0"/>
+              <a:t>Maintains trust as business grows</a:t>
+            </a:r>
+          </a:p>
+          <a:p>
+            <a:endParaRPr lang="en-US" dirty="0"/>
+          </a:p>
+        </p:txBody>
+      </p:sp>
+    </p:spTree>
+    <p:extLst>
+      <p:ext uri="{BB962C8B-B14F-4D97-AF65-F5344CB8AC3E}">
+        <p14:creationId xmlns:p14="http://schemas.microsoft.com/office/powerpoint/2010/main" val="1800710920"/>
+      </p:ext>
+    </p:extLst>
+  </p:cSld>
+  <p:clrMapOvr>
+    <a:masterClrMapping/>
+  </p:clrMapOvr>
+</p:sld>
+</file>
+
+<file path=ppt/slides/slide24.xml><?xml version="1.0" encoding="utf-8"?>
+<p:sld xmlns:a="http://schemas.openxmlformats.org/drawingml/2006/main" xmlns:r="http://schemas.openxmlformats.org/officeDocument/2006/relationships" xmlns:p="http://schemas.openxmlformats.org/presentationml/2006/main">
+  <p:cSld>
+    <p:spTree>
+      <p:nvGrpSpPr>
+        <p:cNvPr id="1" name=""/>
+        <p:cNvGrpSpPr/>
+        <p:nvPr/>
+      </p:nvGrpSpPr>
+      <p:grpSpPr>
+        <a:xfrm>
+          <a:off x="0" y="0"/>
+          <a:ext cx="0" cy="0"/>
+          <a:chOff x="0" y="0"/>
+          <a:chExt cx="0" cy="0"/>
+        </a:xfrm>
+      </p:grpSpPr>
+      <p:sp>
+        <p:nvSpPr>
+          <p:cNvPr id="2" name="Title 1">
+            <a:extLst>
+              <a:ext uri="{FF2B5EF4-FFF2-40B4-BE49-F238E27FC236}">
                 <a16:creationId xmlns:a16="http://schemas.microsoft.com/office/drawing/2014/main" id="{BC654099-789F-835C-317C-CBB2727353D0}"/>
               </a:ext>
             </a:extLst>
@@ -11085,7 +11889,801 @@
 </p:sld>
 </file>
 
-<file path=ppt/slides/slide24.xml><?xml version="1.0" encoding="utf-8"?>
+<file path=ppt/slides/slide25.xml><?xml version="1.0" encoding="utf-8"?>
+<p:sld xmlns:a="http://schemas.openxmlformats.org/drawingml/2006/main" xmlns:r="http://schemas.openxmlformats.org/officeDocument/2006/relationships" xmlns:p="http://schemas.openxmlformats.org/presentationml/2006/main">
+  <p:cSld>
+    <p:spTree>
+      <p:nvGrpSpPr>
+        <p:cNvPr id="1" name=""/>
+        <p:cNvGrpSpPr/>
+        <p:nvPr/>
+      </p:nvGrpSpPr>
+      <p:grpSpPr>
+        <a:xfrm>
+          <a:off x="0" y="0"/>
+          <a:ext cx="0" cy="0"/>
+          <a:chOff x="0" y="0"/>
+          <a:chExt cx="0" cy="0"/>
+        </a:xfrm>
+      </p:grpSpPr>
+      <p:sp>
+        <p:nvSpPr>
+          <p:cNvPr id="2" name="Title 1">
+            <a:extLst>
+              <a:ext uri="{FF2B5EF4-FFF2-40B4-BE49-F238E27FC236}">
+                <a16:creationId xmlns:a16="http://schemas.microsoft.com/office/drawing/2014/main" id="{4225F197-8318-B962-68D3-CADB2749744F}"/>
+              </a:ext>
+            </a:extLst>
+          </p:cNvPr>
+          <p:cNvSpPr>
+            <a:spLocks noGrp="1"/>
+          </p:cNvSpPr>
+          <p:nvPr>
+            <p:ph type="title"/>
+          </p:nvPr>
+        </p:nvSpPr>
+        <p:spPr/>
+        <p:txBody>
+          <a:bodyPr/>
+          <a:lstStyle/>
+          <a:p>
+            <a:endParaRPr lang="en-US"/>
+          </a:p>
+        </p:txBody>
+      </p:sp>
+      <p:sp>
+        <p:nvSpPr>
+          <p:cNvPr id="3" name="Content Placeholder 2">
+            <a:extLst>
+              <a:ext uri="{FF2B5EF4-FFF2-40B4-BE49-F238E27FC236}">
+                <a16:creationId xmlns:a16="http://schemas.microsoft.com/office/drawing/2014/main" id="{5AB3A9FE-7EA3-D606-3342-D79217CCC426}"/>
+              </a:ext>
+            </a:extLst>
+          </p:cNvPr>
+          <p:cNvSpPr>
+            <a:spLocks noGrp="1"/>
+          </p:cNvSpPr>
+          <p:nvPr>
+            <p:ph idx="1"/>
+          </p:nvPr>
+        </p:nvSpPr>
+        <p:spPr/>
+        <p:txBody>
+          <a:bodyPr/>
+          <a:lstStyle/>
+          <a:p>
+            <a:endParaRPr lang="en-US" dirty="0"/>
+          </a:p>
+        </p:txBody>
+      </p:sp>
+      <mc:AlternateContent xmlns:mc="http://schemas.openxmlformats.org/markup-compatibility/2006" xmlns:p14="http://schemas.microsoft.com/office/powerpoint/2010/main">
+        <mc:Choice Requires="p14">
+          <p:contentPart p14:bwMode="auto" r:id="rId2">
+            <p14:nvContentPartPr>
+              <p14:cNvPr id="4" name="Ink 3">
+                <a:extLst>
+                  <a:ext uri="{FF2B5EF4-FFF2-40B4-BE49-F238E27FC236}">
+                    <a16:creationId xmlns:a16="http://schemas.microsoft.com/office/drawing/2014/main" id="{9747351B-46CE-DE0D-8316-755FDDEF7E37}"/>
+                  </a:ext>
+                </a:extLst>
+              </p14:cNvPr>
+              <p14:cNvContentPartPr/>
+              <p14:nvPr/>
+            </p14:nvContentPartPr>
+            <p14:xfrm>
+              <a:off x="7045709" y="2792000"/>
+              <a:ext cx="1774080" cy="1266480"/>
+            </p14:xfrm>
+          </p:contentPart>
+        </mc:Choice>
+        <mc:Fallback xmlns="">
+          <p:pic>
+            <p:nvPicPr>
+              <p:cNvPr id="4" name="Ink 3">
+                <a:extLst>
+                  <a:ext uri="{FF2B5EF4-FFF2-40B4-BE49-F238E27FC236}">
+                    <a16:creationId xmlns:a16="http://schemas.microsoft.com/office/drawing/2014/main" id="{9747351B-46CE-DE0D-8316-755FDDEF7E37}"/>
+                  </a:ext>
+                </a:extLst>
+              </p:cNvPr>
+              <p:cNvPicPr/>
+              <p:nvPr/>
+            </p:nvPicPr>
+            <p:blipFill>
+              <a:blip r:embed="rId3"/>
+              <a:stretch>
+                <a:fillRect/>
+              </a:stretch>
+            </p:blipFill>
+            <p:spPr>
+              <a:xfrm>
+                <a:off x="7039589" y="2785880"/>
+                <a:ext cx="1786320" cy="1278720"/>
+              </a:xfrm>
+              <a:prstGeom prst="rect">
+                <a:avLst/>
+              </a:prstGeom>
+            </p:spPr>
+          </p:pic>
+        </mc:Fallback>
+      </mc:AlternateContent>
+      <mc:AlternateContent xmlns:mc="http://schemas.openxmlformats.org/markup-compatibility/2006" xmlns:p14="http://schemas.microsoft.com/office/powerpoint/2010/main">
+        <mc:Choice Requires="p14">
+          <p:contentPart p14:bwMode="auto" r:id="rId4">
+            <p14:nvContentPartPr>
+              <p14:cNvPr id="5" name="Ink 4">
+                <a:extLst>
+                  <a:ext uri="{FF2B5EF4-FFF2-40B4-BE49-F238E27FC236}">
+                    <a16:creationId xmlns:a16="http://schemas.microsoft.com/office/drawing/2014/main" id="{D63D4B1D-CDCE-A428-1E1A-658278761725}"/>
+                  </a:ext>
+                </a:extLst>
+              </p14:cNvPr>
+              <p14:cNvContentPartPr/>
+              <p14:nvPr/>
+            </p14:nvContentPartPr>
+            <p14:xfrm>
+              <a:off x="1956029" y="3074240"/>
+              <a:ext cx="2168640" cy="1419480"/>
+            </p14:xfrm>
+          </p:contentPart>
+        </mc:Choice>
+        <mc:Fallback xmlns="">
+          <p:pic>
+            <p:nvPicPr>
+              <p:cNvPr id="5" name="Ink 4">
+                <a:extLst>
+                  <a:ext uri="{FF2B5EF4-FFF2-40B4-BE49-F238E27FC236}">
+                    <a16:creationId xmlns:a16="http://schemas.microsoft.com/office/drawing/2014/main" id="{D63D4B1D-CDCE-A428-1E1A-658278761725}"/>
+                  </a:ext>
+                </a:extLst>
+              </p:cNvPr>
+              <p:cNvPicPr/>
+              <p:nvPr/>
+            </p:nvPicPr>
+            <p:blipFill>
+              <a:blip r:embed="rId5"/>
+              <a:stretch>
+                <a:fillRect/>
+              </a:stretch>
+            </p:blipFill>
+            <p:spPr>
+              <a:xfrm>
+                <a:off x="1902389" y="2966240"/>
+                <a:ext cx="2276280" cy="1635120"/>
+              </a:xfrm>
+              <a:prstGeom prst="rect">
+                <a:avLst/>
+              </a:prstGeom>
+            </p:spPr>
+          </p:pic>
+        </mc:Fallback>
+      </mc:AlternateContent>
+      <mc:AlternateContent xmlns:mc="http://schemas.openxmlformats.org/markup-compatibility/2006" xmlns:p14="http://schemas.microsoft.com/office/powerpoint/2010/main">
+        <mc:Choice Requires="p14">
+          <p:contentPart p14:bwMode="auto" r:id="rId6">
+            <p14:nvContentPartPr>
+              <p14:cNvPr id="6" name="Ink 5">
+                <a:extLst>
+                  <a:ext uri="{FF2B5EF4-FFF2-40B4-BE49-F238E27FC236}">
+                    <a16:creationId xmlns:a16="http://schemas.microsoft.com/office/drawing/2014/main" id="{FC589F2F-941C-8E38-9675-C319B2693C87}"/>
+                  </a:ext>
+                </a:extLst>
+              </p14:cNvPr>
+              <p14:cNvContentPartPr/>
+              <p14:nvPr/>
+            </p14:nvContentPartPr>
+            <p14:xfrm>
+              <a:off x="5201069" y="1570160"/>
+              <a:ext cx="2604240" cy="2026080"/>
+            </p14:xfrm>
+          </p:contentPart>
+        </mc:Choice>
+        <mc:Fallback xmlns="">
+          <p:pic>
+            <p:nvPicPr>
+              <p:cNvPr id="6" name="Ink 5">
+                <a:extLst>
+                  <a:ext uri="{FF2B5EF4-FFF2-40B4-BE49-F238E27FC236}">
+                    <a16:creationId xmlns:a16="http://schemas.microsoft.com/office/drawing/2014/main" id="{FC589F2F-941C-8E38-9675-C319B2693C87}"/>
+                  </a:ext>
+                </a:extLst>
+              </p:cNvPr>
+              <p:cNvPicPr/>
+              <p:nvPr/>
+            </p:nvPicPr>
+            <p:blipFill>
+              <a:blip r:embed="rId7"/>
+              <a:stretch>
+                <a:fillRect/>
+              </a:stretch>
+            </p:blipFill>
+            <p:spPr>
+              <a:xfrm>
+                <a:off x="5147429" y="1462520"/>
+                <a:ext cx="2711880" cy="2241720"/>
+              </a:xfrm>
+              <a:prstGeom prst="rect">
+                <a:avLst/>
+              </a:prstGeom>
+            </p:spPr>
+          </p:pic>
+        </mc:Fallback>
+      </mc:AlternateContent>
+      <mc:AlternateContent xmlns:mc="http://schemas.openxmlformats.org/markup-compatibility/2006" xmlns:p14="http://schemas.microsoft.com/office/powerpoint/2010/main">
+        <mc:Choice Requires="p14">
+          <p:contentPart p14:bwMode="auto" r:id="rId8">
+            <p14:nvContentPartPr>
+              <p14:cNvPr id="7" name="Ink 6">
+                <a:extLst>
+                  <a:ext uri="{FF2B5EF4-FFF2-40B4-BE49-F238E27FC236}">
+                    <a16:creationId xmlns:a16="http://schemas.microsoft.com/office/drawing/2014/main" id="{C703887D-B48E-4573-7F81-8E7616BBB211}"/>
+                  </a:ext>
+                </a:extLst>
+              </p14:cNvPr>
+              <p14:cNvContentPartPr/>
+              <p14:nvPr/>
+            </p14:nvContentPartPr>
+            <p14:xfrm>
+              <a:off x="4378109" y="4162880"/>
+              <a:ext cx="3588120" cy="1959120"/>
+            </p14:xfrm>
+          </p:contentPart>
+        </mc:Choice>
+        <mc:Fallback xmlns="">
+          <p:pic>
+            <p:nvPicPr>
+              <p:cNvPr id="7" name="Ink 6">
+                <a:extLst>
+                  <a:ext uri="{FF2B5EF4-FFF2-40B4-BE49-F238E27FC236}">
+                    <a16:creationId xmlns:a16="http://schemas.microsoft.com/office/drawing/2014/main" id="{C703887D-B48E-4573-7F81-8E7616BBB211}"/>
+                  </a:ext>
+                </a:extLst>
+              </p:cNvPr>
+              <p:cNvPicPr/>
+              <p:nvPr/>
+            </p:nvPicPr>
+            <p:blipFill>
+              <a:blip r:embed="rId9"/>
+              <a:stretch>
+                <a:fillRect/>
+              </a:stretch>
+            </p:blipFill>
+            <p:spPr>
+              <a:xfrm>
+                <a:off x="4324469" y="4054880"/>
+                <a:ext cx="3695760" cy="2174760"/>
+              </a:xfrm>
+              <a:prstGeom prst="rect">
+                <a:avLst/>
+              </a:prstGeom>
+            </p:spPr>
+          </p:pic>
+        </mc:Fallback>
+      </mc:AlternateContent>
+      <mc:AlternateContent xmlns:mc="http://schemas.openxmlformats.org/markup-compatibility/2006" xmlns:p14="http://schemas.microsoft.com/office/powerpoint/2010/main">
+        <mc:Choice Requires="p14">
+          <p:contentPart p14:bwMode="auto" r:id="rId10">
+            <p14:nvContentPartPr>
+              <p14:cNvPr id="8" name="Ink 7">
+                <a:extLst>
+                  <a:ext uri="{FF2B5EF4-FFF2-40B4-BE49-F238E27FC236}">
+                    <a16:creationId xmlns:a16="http://schemas.microsoft.com/office/drawing/2014/main" id="{B6AF056A-0A4A-0FAB-C285-A6FD716E7B64}"/>
+                  </a:ext>
+                </a:extLst>
+              </p14:cNvPr>
+              <p14:cNvContentPartPr/>
+              <p14:nvPr/>
+            </p14:nvContentPartPr>
+            <p14:xfrm>
+              <a:off x="282029" y="1911800"/>
+              <a:ext cx="573120" cy="387000"/>
+            </p14:xfrm>
+          </p:contentPart>
+        </mc:Choice>
+        <mc:Fallback xmlns="">
+          <p:pic>
+            <p:nvPicPr>
+              <p:cNvPr id="8" name="Ink 7">
+                <a:extLst>
+                  <a:ext uri="{FF2B5EF4-FFF2-40B4-BE49-F238E27FC236}">
+                    <a16:creationId xmlns:a16="http://schemas.microsoft.com/office/drawing/2014/main" id="{B6AF056A-0A4A-0FAB-C285-A6FD716E7B64}"/>
+                  </a:ext>
+                </a:extLst>
+              </p:cNvPr>
+              <p:cNvPicPr/>
+              <p:nvPr/>
+            </p:nvPicPr>
+            <p:blipFill>
+              <a:blip r:embed="rId11"/>
+              <a:stretch>
+                <a:fillRect/>
+              </a:stretch>
+            </p:blipFill>
+            <p:spPr>
+              <a:xfrm>
+                <a:off x="228029" y="1803800"/>
+                <a:ext cx="680760" cy="602640"/>
+              </a:xfrm>
+              <a:prstGeom prst="rect">
+                <a:avLst/>
+              </a:prstGeom>
+            </p:spPr>
+          </p:pic>
+        </mc:Fallback>
+      </mc:AlternateContent>
+      <mc:AlternateContent xmlns:mc="http://schemas.openxmlformats.org/markup-compatibility/2006" xmlns:p14="http://schemas.microsoft.com/office/powerpoint/2010/main">
+        <mc:Choice Requires="p14">
+          <p:contentPart p14:bwMode="auto" r:id="rId12">
+            <p14:nvContentPartPr>
+              <p14:cNvPr id="9" name="Ink 8">
+                <a:extLst>
+                  <a:ext uri="{FF2B5EF4-FFF2-40B4-BE49-F238E27FC236}">
+                    <a16:creationId xmlns:a16="http://schemas.microsoft.com/office/drawing/2014/main" id="{DD1567E5-BF0B-5DFD-48BF-0B262883BA61}"/>
+                  </a:ext>
+                </a:extLst>
+              </p14:cNvPr>
+              <p14:cNvContentPartPr/>
+              <p14:nvPr/>
+            </p14:nvContentPartPr>
+            <p14:xfrm>
+              <a:off x="484709" y="1927280"/>
+              <a:ext cx="669600" cy="651240"/>
+            </p14:xfrm>
+          </p:contentPart>
+        </mc:Choice>
+        <mc:Fallback xmlns="">
+          <p:pic>
+            <p:nvPicPr>
+              <p:cNvPr id="9" name="Ink 8">
+                <a:extLst>
+                  <a:ext uri="{FF2B5EF4-FFF2-40B4-BE49-F238E27FC236}">
+                    <a16:creationId xmlns:a16="http://schemas.microsoft.com/office/drawing/2014/main" id="{DD1567E5-BF0B-5DFD-48BF-0B262883BA61}"/>
+                  </a:ext>
+                </a:extLst>
+              </p:cNvPr>
+              <p:cNvPicPr/>
+              <p:nvPr/>
+            </p:nvPicPr>
+            <p:blipFill>
+              <a:blip r:embed="rId13"/>
+              <a:stretch>
+                <a:fillRect/>
+              </a:stretch>
+            </p:blipFill>
+            <p:spPr>
+              <a:xfrm>
+                <a:off x="430709" y="1819640"/>
+                <a:ext cx="777240" cy="866880"/>
+              </a:xfrm>
+              <a:prstGeom prst="rect">
+                <a:avLst/>
+              </a:prstGeom>
+            </p:spPr>
+          </p:pic>
+        </mc:Fallback>
+      </mc:AlternateContent>
+      <mc:AlternateContent xmlns:mc="http://schemas.openxmlformats.org/markup-compatibility/2006" xmlns:p14="http://schemas.microsoft.com/office/powerpoint/2010/main">
+        <mc:Choice Requires="p14">
+          <p:contentPart p14:bwMode="auto" r:id="rId14">
+            <p14:nvContentPartPr>
+              <p14:cNvPr id="10" name="Ink 9">
+                <a:extLst>
+                  <a:ext uri="{FF2B5EF4-FFF2-40B4-BE49-F238E27FC236}">
+                    <a16:creationId xmlns:a16="http://schemas.microsoft.com/office/drawing/2014/main" id="{1A6C8490-24D2-ADE4-2FA2-57127CFD4238}"/>
+                  </a:ext>
+                </a:extLst>
+              </p14:cNvPr>
+              <p14:cNvContentPartPr/>
+              <p14:nvPr/>
+            </p14:nvContentPartPr>
+            <p14:xfrm>
+              <a:off x="1420709" y="655760"/>
+              <a:ext cx="563760" cy="5839560"/>
+            </p14:xfrm>
+          </p:contentPart>
+        </mc:Choice>
+        <mc:Fallback xmlns="">
+          <p:pic>
+            <p:nvPicPr>
+              <p:cNvPr id="10" name="Ink 9">
+                <a:extLst>
+                  <a:ext uri="{FF2B5EF4-FFF2-40B4-BE49-F238E27FC236}">
+                    <a16:creationId xmlns:a16="http://schemas.microsoft.com/office/drawing/2014/main" id="{1A6C8490-24D2-ADE4-2FA2-57127CFD4238}"/>
+                  </a:ext>
+                </a:extLst>
+              </p:cNvPr>
+              <p:cNvPicPr/>
+              <p:nvPr/>
+            </p:nvPicPr>
+            <p:blipFill>
+              <a:blip r:embed="rId15"/>
+              <a:stretch>
+                <a:fillRect/>
+              </a:stretch>
+            </p:blipFill>
+            <p:spPr>
+              <a:xfrm>
+                <a:off x="1367069" y="547760"/>
+                <a:ext cx="671400" cy="6055200"/>
+              </a:xfrm>
+              <a:prstGeom prst="rect">
+                <a:avLst/>
+              </a:prstGeom>
+            </p:spPr>
+          </p:pic>
+        </mc:Fallback>
+      </mc:AlternateContent>
+      <mc:AlternateContent xmlns:mc="http://schemas.openxmlformats.org/markup-compatibility/2006" xmlns:p14="http://schemas.microsoft.com/office/powerpoint/2010/main">
+        <mc:Choice Requires="p14">
+          <p:contentPart p14:bwMode="auto" r:id="rId16">
+            <p14:nvContentPartPr>
+              <p14:cNvPr id="11" name="Ink 10">
+                <a:extLst>
+                  <a:ext uri="{FF2B5EF4-FFF2-40B4-BE49-F238E27FC236}">
+                    <a16:creationId xmlns:a16="http://schemas.microsoft.com/office/drawing/2014/main" id="{C0A06DAC-910D-B614-7DC1-F33A2D6EB13A}"/>
+                  </a:ext>
+                </a:extLst>
+              </p14:cNvPr>
+              <p14:cNvContentPartPr/>
+              <p14:nvPr/>
+            </p14:nvContentPartPr>
+            <p14:xfrm>
+              <a:off x="2821109" y="2652320"/>
+              <a:ext cx="14040" cy="706680"/>
+            </p14:xfrm>
+          </p:contentPart>
+        </mc:Choice>
+        <mc:Fallback xmlns="">
+          <p:pic>
+            <p:nvPicPr>
+              <p:cNvPr id="11" name="Ink 10">
+                <a:extLst>
+                  <a:ext uri="{FF2B5EF4-FFF2-40B4-BE49-F238E27FC236}">
+                    <a16:creationId xmlns:a16="http://schemas.microsoft.com/office/drawing/2014/main" id="{C0A06DAC-910D-B614-7DC1-F33A2D6EB13A}"/>
+                  </a:ext>
+                </a:extLst>
+              </p:cNvPr>
+              <p:cNvPicPr/>
+              <p:nvPr/>
+            </p:nvPicPr>
+            <p:blipFill>
+              <a:blip r:embed="rId17"/>
+              <a:stretch>
+                <a:fillRect/>
+              </a:stretch>
+            </p:blipFill>
+            <p:spPr>
+              <a:xfrm>
+                <a:off x="2767469" y="2544320"/>
+                <a:ext cx="121680" cy="922320"/>
+              </a:xfrm>
+              <a:prstGeom prst="rect">
+                <a:avLst/>
+              </a:prstGeom>
+            </p:spPr>
+          </p:pic>
+        </mc:Fallback>
+      </mc:AlternateContent>
+      <mc:AlternateContent xmlns:mc="http://schemas.openxmlformats.org/markup-compatibility/2006" xmlns:p14="http://schemas.microsoft.com/office/powerpoint/2010/main">
+        <mc:Choice Requires="p14">
+          <p:contentPart p14:bwMode="auto" r:id="rId18">
+            <p14:nvContentPartPr>
+              <p14:cNvPr id="12" name="Ink 11">
+                <a:extLst>
+                  <a:ext uri="{FF2B5EF4-FFF2-40B4-BE49-F238E27FC236}">
+                    <a16:creationId xmlns:a16="http://schemas.microsoft.com/office/drawing/2014/main" id="{0BEC9CF5-F9C4-AF32-3957-F16925D98B37}"/>
+                  </a:ext>
+                </a:extLst>
+              </p14:cNvPr>
+              <p14:cNvContentPartPr/>
+              <p14:nvPr/>
+            </p14:nvContentPartPr>
+            <p14:xfrm>
+              <a:off x="6169469" y="1161920"/>
+              <a:ext cx="2520" cy="1165320"/>
+            </p14:xfrm>
+          </p:contentPart>
+        </mc:Choice>
+        <mc:Fallback xmlns="">
+          <p:pic>
+            <p:nvPicPr>
+              <p:cNvPr id="12" name="Ink 11">
+                <a:extLst>
+                  <a:ext uri="{FF2B5EF4-FFF2-40B4-BE49-F238E27FC236}">
+                    <a16:creationId xmlns:a16="http://schemas.microsoft.com/office/drawing/2014/main" id="{0BEC9CF5-F9C4-AF32-3957-F16925D98B37}"/>
+                  </a:ext>
+                </a:extLst>
+              </p:cNvPr>
+              <p:cNvPicPr/>
+              <p:nvPr/>
+            </p:nvPicPr>
+            <p:blipFill>
+              <a:blip r:embed="rId19"/>
+              <a:stretch>
+                <a:fillRect/>
+              </a:stretch>
+            </p:blipFill>
+            <p:spPr>
+              <a:xfrm>
+                <a:off x="6115469" y="1053920"/>
+                <a:ext cx="110160" cy="1380960"/>
+              </a:xfrm>
+              <a:prstGeom prst="rect">
+                <a:avLst/>
+              </a:prstGeom>
+            </p:spPr>
+          </p:pic>
+        </mc:Fallback>
+      </mc:AlternateContent>
+      <mc:AlternateContent xmlns:mc="http://schemas.openxmlformats.org/markup-compatibility/2006" xmlns:p14="http://schemas.microsoft.com/office/powerpoint/2010/main">
+        <mc:Choice Requires="p14">
+          <p:contentPart p14:bwMode="auto" r:id="rId20">
+            <p14:nvContentPartPr>
+              <p14:cNvPr id="13" name="Ink 12">
+                <a:extLst>
+                  <a:ext uri="{FF2B5EF4-FFF2-40B4-BE49-F238E27FC236}">
+                    <a16:creationId xmlns:a16="http://schemas.microsoft.com/office/drawing/2014/main" id="{EDF2E44C-5107-DBD6-20C2-3E5D11633975}"/>
+                  </a:ext>
+                </a:extLst>
+              </p14:cNvPr>
+              <p14:cNvContentPartPr/>
+              <p14:nvPr/>
+            </p14:nvContentPartPr>
+            <p14:xfrm>
+              <a:off x="5189909" y="5491640"/>
+              <a:ext cx="360" cy="1069200"/>
+            </p14:xfrm>
+          </p:contentPart>
+        </mc:Choice>
+        <mc:Fallback xmlns="">
+          <p:pic>
+            <p:nvPicPr>
+              <p:cNvPr id="13" name="Ink 12">
+                <a:extLst>
+                  <a:ext uri="{FF2B5EF4-FFF2-40B4-BE49-F238E27FC236}">
+                    <a16:creationId xmlns:a16="http://schemas.microsoft.com/office/drawing/2014/main" id="{EDF2E44C-5107-DBD6-20C2-3E5D11633975}"/>
+                  </a:ext>
+                </a:extLst>
+              </p:cNvPr>
+              <p:cNvPicPr/>
+              <p:nvPr/>
+            </p:nvPicPr>
+            <p:blipFill>
+              <a:blip r:embed="rId21"/>
+              <a:stretch>
+                <a:fillRect/>
+              </a:stretch>
+            </p:blipFill>
+            <p:spPr>
+              <a:xfrm>
+                <a:off x="5135909" y="5383640"/>
+                <a:ext cx="108000" cy="1284840"/>
+              </a:xfrm>
+              <a:prstGeom prst="rect">
+                <a:avLst/>
+              </a:prstGeom>
+            </p:spPr>
+          </p:pic>
+        </mc:Fallback>
+      </mc:AlternateContent>
+      <mc:AlternateContent xmlns:mc="http://schemas.openxmlformats.org/markup-compatibility/2006" xmlns:p14="http://schemas.microsoft.com/office/powerpoint/2010/main">
+        <mc:Choice Requires="p14">
+          <p:contentPart p14:bwMode="auto" r:id="rId22">
+            <p14:nvContentPartPr>
+              <p14:cNvPr id="14" name="Ink 13">
+                <a:extLst>
+                  <a:ext uri="{FF2B5EF4-FFF2-40B4-BE49-F238E27FC236}">
+                    <a16:creationId xmlns:a16="http://schemas.microsoft.com/office/drawing/2014/main" id="{559BAA07-1C00-BAE9-E88F-76129CA46831}"/>
+                  </a:ext>
+                </a:extLst>
+              </p14:cNvPr>
+              <p14:cNvContentPartPr/>
+              <p14:nvPr/>
+            </p14:nvContentPartPr>
+            <p14:xfrm>
+              <a:off x="3167069" y="5051360"/>
+              <a:ext cx="681120" cy="718920"/>
+            </p14:xfrm>
+          </p:contentPart>
+        </mc:Choice>
+        <mc:Fallback xmlns="">
+          <p:pic>
+            <p:nvPicPr>
+              <p:cNvPr id="14" name="Ink 13">
+                <a:extLst>
+                  <a:ext uri="{FF2B5EF4-FFF2-40B4-BE49-F238E27FC236}">
+                    <a16:creationId xmlns:a16="http://schemas.microsoft.com/office/drawing/2014/main" id="{559BAA07-1C00-BAE9-E88F-76129CA46831}"/>
+                  </a:ext>
+                </a:extLst>
+              </p:cNvPr>
+              <p:cNvPicPr/>
+              <p:nvPr/>
+            </p:nvPicPr>
+            <p:blipFill>
+              <a:blip r:embed="rId23"/>
+              <a:stretch>
+                <a:fillRect/>
+              </a:stretch>
+            </p:blipFill>
+            <p:spPr>
+              <a:xfrm>
+                <a:off x="3113069" y="4943720"/>
+                <a:ext cx="788760" cy="934560"/>
+              </a:xfrm>
+              <a:prstGeom prst="rect">
+                <a:avLst/>
+              </a:prstGeom>
+            </p:spPr>
+          </p:pic>
+        </mc:Fallback>
+      </mc:AlternateContent>
+      <mc:AlternateContent xmlns:mc="http://schemas.openxmlformats.org/markup-compatibility/2006" xmlns:p14="http://schemas.microsoft.com/office/powerpoint/2010/main">
+        <mc:Choice Requires="p14">
+          <p:contentPart p14:bwMode="auto" r:id="rId24">
+            <p14:nvContentPartPr>
+              <p14:cNvPr id="15" name="Ink 14">
+                <a:extLst>
+                  <a:ext uri="{FF2B5EF4-FFF2-40B4-BE49-F238E27FC236}">
+                    <a16:creationId xmlns:a16="http://schemas.microsoft.com/office/drawing/2014/main" id="{FDE0137F-7EEE-F6A3-732D-14CD535854C5}"/>
+                  </a:ext>
+                </a:extLst>
+              </p14:cNvPr>
+              <p14:cNvContentPartPr/>
+              <p14:nvPr/>
+            </p14:nvContentPartPr>
+            <p14:xfrm>
+              <a:off x="2986709" y="4783520"/>
+              <a:ext cx="874080" cy="1239840"/>
+            </p14:xfrm>
+          </p:contentPart>
+        </mc:Choice>
+        <mc:Fallback xmlns="">
+          <p:pic>
+            <p:nvPicPr>
+              <p:cNvPr id="15" name="Ink 14">
+                <a:extLst>
+                  <a:ext uri="{FF2B5EF4-FFF2-40B4-BE49-F238E27FC236}">
+                    <a16:creationId xmlns:a16="http://schemas.microsoft.com/office/drawing/2014/main" id="{FDE0137F-7EEE-F6A3-732D-14CD535854C5}"/>
+                  </a:ext>
+                </a:extLst>
+              </p:cNvPr>
+              <p:cNvPicPr/>
+              <p:nvPr/>
+            </p:nvPicPr>
+            <p:blipFill>
+              <a:blip r:embed="rId25"/>
+              <a:stretch>
+                <a:fillRect/>
+              </a:stretch>
+            </p:blipFill>
+            <p:spPr>
+              <a:xfrm>
+                <a:off x="2933069" y="4675880"/>
+                <a:ext cx="981720" cy="1455480"/>
+              </a:xfrm>
+              <a:prstGeom prst="rect">
+                <a:avLst/>
+              </a:prstGeom>
+            </p:spPr>
+          </p:pic>
+        </mc:Fallback>
+      </mc:AlternateContent>
+      <mc:AlternateContent xmlns:mc="http://schemas.openxmlformats.org/markup-compatibility/2006" xmlns:p14="http://schemas.microsoft.com/office/powerpoint/2010/main">
+        <mc:Choice Requires="p14">
+          <p:contentPart p14:bwMode="auto" r:id="rId26">
+            <p14:nvContentPartPr>
+              <p14:cNvPr id="16" name="Ink 15">
+                <a:extLst>
+                  <a:ext uri="{FF2B5EF4-FFF2-40B4-BE49-F238E27FC236}">
+                    <a16:creationId xmlns:a16="http://schemas.microsoft.com/office/drawing/2014/main" id="{59679D33-07B9-8B9C-FF1E-AC74480E6310}"/>
+                  </a:ext>
+                </a:extLst>
+              </p14:cNvPr>
+              <p14:cNvContentPartPr/>
+              <p14:nvPr/>
+            </p14:nvContentPartPr>
+            <p14:xfrm>
+              <a:off x="2324309" y="2555120"/>
+              <a:ext cx="926640" cy="657000"/>
+            </p14:xfrm>
+          </p:contentPart>
+        </mc:Choice>
+        <mc:Fallback xmlns="">
+          <p:pic>
+            <p:nvPicPr>
+              <p:cNvPr id="16" name="Ink 15">
+                <a:extLst>
+                  <a:ext uri="{FF2B5EF4-FFF2-40B4-BE49-F238E27FC236}">
+                    <a16:creationId xmlns:a16="http://schemas.microsoft.com/office/drawing/2014/main" id="{59679D33-07B9-8B9C-FF1E-AC74480E6310}"/>
+                  </a:ext>
+                </a:extLst>
+              </p:cNvPr>
+              <p:cNvPicPr/>
+              <p:nvPr/>
+            </p:nvPicPr>
+            <p:blipFill>
+              <a:blip r:embed="rId27"/>
+              <a:stretch>
+                <a:fillRect/>
+              </a:stretch>
+            </p:blipFill>
+            <p:spPr>
+              <a:xfrm>
+                <a:off x="2270309" y="2447480"/>
+                <a:ext cx="1034280" cy="872640"/>
+              </a:xfrm>
+              <a:prstGeom prst="rect">
+                <a:avLst/>
+              </a:prstGeom>
+            </p:spPr>
+          </p:pic>
+        </mc:Fallback>
+      </mc:AlternateContent>
+      <mc:AlternateContent xmlns:mc="http://schemas.openxmlformats.org/markup-compatibility/2006" xmlns:p14="http://schemas.microsoft.com/office/powerpoint/2010/main">
+        <mc:Choice Requires="p14">
+          <p:contentPart p14:bwMode="auto" r:id="rId28">
+            <p14:nvContentPartPr>
+              <p14:cNvPr id="17" name="Ink 16">
+                <a:extLst>
+                  <a:ext uri="{FF2B5EF4-FFF2-40B4-BE49-F238E27FC236}">
+                    <a16:creationId xmlns:a16="http://schemas.microsoft.com/office/drawing/2014/main" id="{474927AA-F14B-7947-ABBC-5EF948C63CA4}"/>
+                  </a:ext>
+                </a:extLst>
+              </p14:cNvPr>
+              <p14:cNvContentPartPr/>
+              <p14:nvPr/>
+            </p14:nvContentPartPr>
+            <p14:xfrm>
+              <a:off x="2762069" y="2641520"/>
+              <a:ext cx="534960" cy="766080"/>
+            </p14:xfrm>
+          </p:contentPart>
+        </mc:Choice>
+        <mc:Fallback xmlns="">
+          <p:pic>
+            <p:nvPicPr>
+              <p:cNvPr id="17" name="Ink 16">
+                <a:extLst>
+                  <a:ext uri="{FF2B5EF4-FFF2-40B4-BE49-F238E27FC236}">
+                    <a16:creationId xmlns:a16="http://schemas.microsoft.com/office/drawing/2014/main" id="{474927AA-F14B-7947-ABBC-5EF948C63CA4}"/>
+                  </a:ext>
+                </a:extLst>
+              </p:cNvPr>
+              <p:cNvPicPr/>
+              <p:nvPr/>
+            </p:nvPicPr>
+            <p:blipFill>
+              <a:blip r:embed="rId29"/>
+              <a:stretch>
+                <a:fillRect/>
+              </a:stretch>
+            </p:blipFill>
+            <p:spPr>
+              <a:xfrm>
+                <a:off x="2708429" y="2533880"/>
+                <a:ext cx="642600" cy="981720"/>
+              </a:xfrm>
+              <a:prstGeom prst="rect">
+                <a:avLst/>
+              </a:prstGeom>
+            </p:spPr>
+          </p:pic>
+        </mc:Fallback>
+      </mc:AlternateContent>
+    </p:spTree>
+    <p:extLst>
+      <p:ext uri="{BB962C8B-B14F-4D97-AF65-F5344CB8AC3E}">
+        <p14:creationId xmlns:p14="http://schemas.microsoft.com/office/powerpoint/2010/main" val="905298824"/>
+      </p:ext>
+    </p:extLst>
+  </p:cSld>
+  <p:clrMapOvr>
+    <a:masterClrMapping/>
+  </p:clrMapOvr>
+</p:sld>
+</file>
+
+<file path=ppt/slides/slide26.xml><?xml version="1.0" encoding="utf-8"?>
 <p:sld xmlns:a="http://schemas.openxmlformats.org/drawingml/2006/main" xmlns:r="http://schemas.openxmlformats.org/officeDocument/2006/relationships" xmlns:p="http://schemas.openxmlformats.org/presentationml/2006/main">
   <p:cSld>
     <p:spTree>
@@ -11232,6 +12830,312 @@
           </a:extLst>
         </p:spPr>
       </p:pic>
+      <mc:AlternateContent xmlns:mc="http://schemas.openxmlformats.org/markup-compatibility/2006" xmlns:p14="http://schemas.microsoft.com/office/powerpoint/2010/main">
+        <mc:Choice Requires="p14">
+          <p:contentPart p14:bwMode="auto" r:id="rId3">
+            <p14:nvContentPartPr>
+              <p14:cNvPr id="5" name="Ink 4">
+                <a:extLst>
+                  <a:ext uri="{FF2B5EF4-FFF2-40B4-BE49-F238E27FC236}">
+                    <a16:creationId xmlns:a16="http://schemas.microsoft.com/office/drawing/2014/main" id="{97CBE092-A441-B9F1-D00F-4942F9C1549C}"/>
+                  </a:ext>
+                </a:extLst>
+              </p14:cNvPr>
+              <p14:cNvContentPartPr/>
+              <p14:nvPr/>
+            </p14:nvContentPartPr>
+            <p14:xfrm>
+              <a:off x="7126349" y="3213560"/>
+              <a:ext cx="1804320" cy="1243800"/>
+            </p14:xfrm>
+          </p:contentPart>
+        </mc:Choice>
+        <mc:Fallback xmlns="">
+          <p:pic>
+            <p:nvPicPr>
+              <p:cNvPr id="5" name="Ink 4">
+                <a:extLst>
+                  <a:ext uri="{FF2B5EF4-FFF2-40B4-BE49-F238E27FC236}">
+                    <a16:creationId xmlns:a16="http://schemas.microsoft.com/office/drawing/2014/main" id="{97CBE092-A441-B9F1-D00F-4942F9C1549C}"/>
+                  </a:ext>
+                </a:extLst>
+              </p:cNvPr>
+              <p:cNvPicPr/>
+              <p:nvPr/>
+            </p:nvPicPr>
+            <p:blipFill>
+              <a:blip r:embed="rId4"/>
+              <a:stretch>
+                <a:fillRect/>
+              </a:stretch>
+            </p:blipFill>
+            <p:spPr>
+              <a:xfrm>
+                <a:off x="7072349" y="3105560"/>
+                <a:ext cx="1911960" cy="1459440"/>
+              </a:xfrm>
+              <a:prstGeom prst="rect">
+                <a:avLst/>
+              </a:prstGeom>
+            </p:spPr>
+          </p:pic>
+        </mc:Fallback>
+      </mc:AlternateContent>
+      <mc:AlternateContent xmlns:mc="http://schemas.openxmlformats.org/markup-compatibility/2006" xmlns:p14="http://schemas.microsoft.com/office/powerpoint/2010/main">
+        <mc:Choice Requires="p14">
+          <p:contentPart p14:bwMode="auto" r:id="rId5">
+            <p14:nvContentPartPr>
+              <p14:cNvPr id="6" name="Ink 5">
+                <a:extLst>
+                  <a:ext uri="{FF2B5EF4-FFF2-40B4-BE49-F238E27FC236}">
+                    <a16:creationId xmlns:a16="http://schemas.microsoft.com/office/drawing/2014/main" id="{1E9B6FF7-7D64-8191-29FD-82BAECBF9560}"/>
+                  </a:ext>
+                </a:extLst>
+              </p14:cNvPr>
+              <p14:cNvContentPartPr/>
+              <p14:nvPr/>
+            </p14:nvContentPartPr>
+            <p14:xfrm>
+              <a:off x="6408869" y="4587320"/>
+              <a:ext cx="1465200" cy="1329840"/>
+            </p14:xfrm>
+          </p:contentPart>
+        </mc:Choice>
+        <mc:Fallback xmlns="">
+          <p:pic>
+            <p:nvPicPr>
+              <p:cNvPr id="6" name="Ink 5">
+                <a:extLst>
+                  <a:ext uri="{FF2B5EF4-FFF2-40B4-BE49-F238E27FC236}">
+                    <a16:creationId xmlns:a16="http://schemas.microsoft.com/office/drawing/2014/main" id="{1E9B6FF7-7D64-8191-29FD-82BAECBF9560}"/>
+                  </a:ext>
+                </a:extLst>
+              </p:cNvPr>
+              <p:cNvPicPr/>
+              <p:nvPr/>
+            </p:nvPicPr>
+            <p:blipFill>
+              <a:blip r:embed="rId6"/>
+              <a:stretch>
+                <a:fillRect/>
+              </a:stretch>
+            </p:blipFill>
+            <p:spPr>
+              <a:xfrm>
+                <a:off x="6354869" y="4479680"/>
+                <a:ext cx="1572840" cy="1545480"/>
+              </a:xfrm>
+              <a:prstGeom prst="rect">
+                <a:avLst/>
+              </a:prstGeom>
+            </p:spPr>
+          </p:pic>
+        </mc:Fallback>
+      </mc:AlternateContent>
+      <mc:AlternateContent xmlns:mc="http://schemas.openxmlformats.org/markup-compatibility/2006" xmlns:p14="http://schemas.microsoft.com/office/powerpoint/2010/main">
+        <mc:Choice Requires="p14">
+          <p:contentPart p14:bwMode="auto" r:id="rId7">
+            <p14:nvContentPartPr>
+              <p14:cNvPr id="7" name="Ink 6">
+                <a:extLst>
+                  <a:ext uri="{FF2B5EF4-FFF2-40B4-BE49-F238E27FC236}">
+                    <a16:creationId xmlns:a16="http://schemas.microsoft.com/office/drawing/2014/main" id="{45048370-BE5D-0803-871F-C08050CB5157}"/>
+                  </a:ext>
+                </a:extLst>
+              </p14:cNvPr>
+              <p14:cNvContentPartPr/>
+              <p14:nvPr/>
+            </p14:nvContentPartPr>
+            <p14:xfrm>
+              <a:off x="5903429" y="3188360"/>
+              <a:ext cx="609840" cy="740880"/>
+            </p14:xfrm>
+          </p:contentPart>
+        </mc:Choice>
+        <mc:Fallback xmlns="">
+          <p:pic>
+            <p:nvPicPr>
+              <p:cNvPr id="7" name="Ink 6">
+                <a:extLst>
+                  <a:ext uri="{FF2B5EF4-FFF2-40B4-BE49-F238E27FC236}">
+                    <a16:creationId xmlns:a16="http://schemas.microsoft.com/office/drawing/2014/main" id="{45048370-BE5D-0803-871F-C08050CB5157}"/>
+                  </a:ext>
+                </a:extLst>
+              </p:cNvPr>
+              <p:cNvPicPr/>
+              <p:nvPr/>
+            </p:nvPicPr>
+            <p:blipFill>
+              <a:blip r:embed="rId8"/>
+              <a:stretch>
+                <a:fillRect/>
+              </a:stretch>
+            </p:blipFill>
+            <p:spPr>
+              <a:xfrm>
+                <a:off x="5849789" y="3080720"/>
+                <a:ext cx="717480" cy="956520"/>
+              </a:xfrm>
+              <a:prstGeom prst="rect">
+                <a:avLst/>
+              </a:prstGeom>
+            </p:spPr>
+          </p:pic>
+        </mc:Fallback>
+      </mc:AlternateContent>
+      <mc:AlternateContent xmlns:mc="http://schemas.openxmlformats.org/markup-compatibility/2006" xmlns:p14="http://schemas.microsoft.com/office/powerpoint/2010/main">
+        <mc:Choice Requires="p14">
+          <p:contentPart p14:bwMode="auto" r:id="rId9">
+            <p14:nvContentPartPr>
+              <p14:cNvPr id="8" name="Ink 7">
+                <a:extLst>
+                  <a:ext uri="{FF2B5EF4-FFF2-40B4-BE49-F238E27FC236}">
+                    <a16:creationId xmlns:a16="http://schemas.microsoft.com/office/drawing/2014/main" id="{49956683-308B-978D-97FB-CD3FBA6F08E9}"/>
+                  </a:ext>
+                </a:extLst>
+              </p14:cNvPr>
+              <p14:cNvContentPartPr/>
+              <p14:nvPr/>
+            </p14:nvContentPartPr>
+            <p14:xfrm>
+              <a:off x="5340389" y="2730800"/>
+              <a:ext cx="1271520" cy="1415520"/>
+            </p14:xfrm>
+          </p:contentPart>
+        </mc:Choice>
+        <mc:Fallback xmlns="">
+          <p:pic>
+            <p:nvPicPr>
+              <p:cNvPr id="8" name="Ink 7">
+                <a:extLst>
+                  <a:ext uri="{FF2B5EF4-FFF2-40B4-BE49-F238E27FC236}">
+                    <a16:creationId xmlns:a16="http://schemas.microsoft.com/office/drawing/2014/main" id="{49956683-308B-978D-97FB-CD3FBA6F08E9}"/>
+                  </a:ext>
+                </a:extLst>
+              </p:cNvPr>
+              <p:cNvPicPr/>
+              <p:nvPr/>
+            </p:nvPicPr>
+            <p:blipFill>
+              <a:blip r:embed="rId10"/>
+              <a:stretch>
+                <a:fillRect/>
+              </a:stretch>
+            </p:blipFill>
+            <p:spPr>
+              <a:xfrm>
+                <a:off x="5286749" y="2622800"/>
+                <a:ext cx="1379160" cy="1631160"/>
+              </a:xfrm>
+              <a:prstGeom prst="rect">
+                <a:avLst/>
+              </a:prstGeom>
+            </p:spPr>
+          </p:pic>
+        </mc:Fallback>
+      </mc:AlternateContent>
+      <mc:AlternateContent xmlns:mc="http://schemas.openxmlformats.org/markup-compatibility/2006" xmlns:p14="http://schemas.microsoft.com/office/powerpoint/2010/main">
+        <mc:Choice Requires="p14">
+          <p:contentPart p14:bwMode="auto" r:id="rId11">
+            <p14:nvContentPartPr>
+              <p14:cNvPr id="9" name="Ink 8">
+                <a:extLst>
+                  <a:ext uri="{FF2B5EF4-FFF2-40B4-BE49-F238E27FC236}">
+                    <a16:creationId xmlns:a16="http://schemas.microsoft.com/office/drawing/2014/main" id="{490A5590-D839-D4DE-6E46-DCA88FEAF3CC}"/>
+                  </a:ext>
+                </a:extLst>
+              </p14:cNvPr>
+              <p14:cNvContentPartPr/>
+              <p14:nvPr/>
+            </p14:nvContentPartPr>
+            <p14:xfrm>
+              <a:off x="4881389" y="2283680"/>
+              <a:ext cx="45000" cy="3818160"/>
+            </p14:xfrm>
+          </p:contentPart>
+        </mc:Choice>
+        <mc:Fallback xmlns="">
+          <p:pic>
+            <p:nvPicPr>
+              <p:cNvPr id="9" name="Ink 8">
+                <a:extLst>
+                  <a:ext uri="{FF2B5EF4-FFF2-40B4-BE49-F238E27FC236}">
+                    <a16:creationId xmlns:a16="http://schemas.microsoft.com/office/drawing/2014/main" id="{490A5590-D839-D4DE-6E46-DCA88FEAF3CC}"/>
+                  </a:ext>
+                </a:extLst>
+              </p:cNvPr>
+              <p:cNvPicPr/>
+              <p:nvPr/>
+            </p:nvPicPr>
+            <p:blipFill>
+              <a:blip r:embed="rId12"/>
+              <a:stretch>
+                <a:fillRect/>
+              </a:stretch>
+            </p:blipFill>
+            <p:spPr>
+              <a:xfrm>
+                <a:off x="4827389" y="2175680"/>
+                <a:ext cx="152640" cy="4033800"/>
+              </a:xfrm>
+              <a:prstGeom prst="rect">
+                <a:avLst/>
+              </a:prstGeom>
+            </p:spPr>
+          </p:pic>
+        </mc:Fallback>
+      </mc:AlternateContent>
+      <mc:AlternateContent xmlns:mc="http://schemas.openxmlformats.org/markup-compatibility/2006" xmlns:p14="http://schemas.microsoft.com/office/powerpoint/2010/main">
+        <mc:Choice Requires="p14">
+          <p:contentPart p14:bwMode="auto" r:id="rId13">
+            <p14:nvContentPartPr>
+              <p14:cNvPr id="10" name="Ink 9">
+                <a:extLst>
+                  <a:ext uri="{FF2B5EF4-FFF2-40B4-BE49-F238E27FC236}">
+                    <a16:creationId xmlns:a16="http://schemas.microsoft.com/office/drawing/2014/main" id="{AD7BE12A-D66B-9D8B-63E1-32A786E87EC4}"/>
+                  </a:ext>
+                </a:extLst>
+              </p14:cNvPr>
+              <p14:cNvContentPartPr/>
+              <p14:nvPr/>
+            </p14:nvContentPartPr>
+            <p14:xfrm>
+              <a:off x="4926029" y="2263520"/>
+              <a:ext cx="4818960" cy="3823200"/>
+            </p14:xfrm>
+          </p:contentPart>
+        </mc:Choice>
+        <mc:Fallback xmlns="">
+          <p:pic>
+            <p:nvPicPr>
+              <p:cNvPr id="10" name="Ink 9">
+                <a:extLst>
+                  <a:ext uri="{FF2B5EF4-FFF2-40B4-BE49-F238E27FC236}">
+                    <a16:creationId xmlns:a16="http://schemas.microsoft.com/office/drawing/2014/main" id="{AD7BE12A-D66B-9D8B-63E1-32A786E87EC4}"/>
+                  </a:ext>
+                </a:extLst>
+              </p:cNvPr>
+              <p:cNvPicPr/>
+              <p:nvPr/>
+            </p:nvPicPr>
+            <p:blipFill>
+              <a:blip r:embed="rId14"/>
+              <a:stretch>
+                <a:fillRect/>
+              </a:stretch>
+            </p:blipFill>
+            <p:spPr>
+              <a:xfrm>
+                <a:off x="4872029" y="2155880"/>
+                <a:ext cx="4926600" cy="4038840"/>
+              </a:xfrm>
+              <a:prstGeom prst="rect">
+                <a:avLst/>
+              </a:prstGeom>
+            </p:spPr>
+          </p:pic>
+        </mc:Fallback>
+      </mc:AlternateContent>
     </p:spTree>
     <p:extLst>
       <p:ext uri="{BB962C8B-B14F-4D97-AF65-F5344CB8AC3E}">
@@ -11245,7 +13149,7 @@
 </p:sld>
 </file>
 
-<file path=ppt/slides/slide25.xml><?xml version="1.0" encoding="utf-8"?>
+<file path=ppt/slides/slide27.xml><?xml version="1.0" encoding="utf-8"?>
 <p:sld xmlns:a="http://schemas.openxmlformats.org/drawingml/2006/main" xmlns:r="http://schemas.openxmlformats.org/officeDocument/2006/relationships" xmlns:p="http://schemas.openxmlformats.org/presentationml/2006/main">
   <p:cSld>
     <p:spTree>
@@ -11396,7 +13300,7 @@
 </p:sld>
 </file>
 
-<file path=ppt/slides/slide26.xml><?xml version="1.0" encoding="utf-8"?>
+<file path=ppt/slides/slide28.xml><?xml version="1.0" encoding="utf-8"?>
 <p:sld xmlns:a="http://schemas.openxmlformats.org/drawingml/2006/main" xmlns:r="http://schemas.openxmlformats.org/officeDocument/2006/relationships" xmlns:p="http://schemas.openxmlformats.org/presentationml/2006/main">
   <p:cSld>
     <p:spTree>
@@ -11542,7 +13446,7 @@
 </p:sld>
 </file>
 
-<file path=ppt/slides/slide27.xml><?xml version="1.0" encoding="utf-8"?>
+<file path=ppt/slides/slide29.xml><?xml version="1.0" encoding="utf-8"?>
 <p:sld xmlns:a="http://schemas.openxmlformats.org/drawingml/2006/main" xmlns:r="http://schemas.openxmlformats.org/officeDocument/2006/relationships" xmlns:p="http://schemas.openxmlformats.org/presentationml/2006/main">
   <p:cSld>
     <p:spTree>
@@ -11672,286 +13576,6 @@
     <p:extLst>
       <p:ext uri="{BB962C8B-B14F-4D97-AF65-F5344CB8AC3E}">
         <p14:creationId xmlns:p14="http://schemas.microsoft.com/office/powerpoint/2010/main" val="750820097"/>
-      </p:ext>
-    </p:extLst>
-  </p:cSld>
-  <p:clrMapOvr>
-    <a:masterClrMapping/>
-  </p:clrMapOvr>
-</p:sld>
-</file>
-
-<file path=ppt/slides/slide28.xml><?xml version="1.0" encoding="utf-8"?>
-<p:sld xmlns:a="http://schemas.openxmlformats.org/drawingml/2006/main" xmlns:r="http://schemas.openxmlformats.org/officeDocument/2006/relationships" xmlns:p="http://schemas.openxmlformats.org/presentationml/2006/main">
-  <p:cSld>
-    <p:spTree>
-      <p:nvGrpSpPr>
-        <p:cNvPr id="1" name=""/>
-        <p:cNvGrpSpPr/>
-        <p:nvPr/>
-      </p:nvGrpSpPr>
-      <p:grpSpPr>
-        <a:xfrm>
-          <a:off x="0" y="0"/>
-          <a:ext cx="0" cy="0"/>
-          <a:chOff x="0" y="0"/>
-          <a:chExt cx="0" cy="0"/>
-        </a:xfrm>
-      </p:grpSpPr>
-      <p:sp>
-        <p:nvSpPr>
-          <p:cNvPr id="2" name="Title 1">
-            <a:extLst>
-              <a:ext uri="{FF2B5EF4-FFF2-40B4-BE49-F238E27FC236}">
-                <a16:creationId xmlns:a16="http://schemas.microsoft.com/office/drawing/2014/main" id="{8E73C055-2D8A-FA26-1D50-C195EC2C9C3E}"/>
-              </a:ext>
-            </a:extLst>
-          </p:cNvPr>
-          <p:cNvSpPr>
-            <a:spLocks noGrp="1"/>
-          </p:cNvSpPr>
-          <p:nvPr>
-            <p:ph type="title"/>
-          </p:nvPr>
-        </p:nvSpPr>
-        <p:spPr/>
-        <p:txBody>
-          <a:bodyPr/>
-          <a:lstStyle/>
-          <a:p>
-            <a:r>
-              <a:rPr lang="en-US" dirty="0"/>
-              <a:t>CAP Theorem</a:t>
-            </a:r>
-          </a:p>
-        </p:txBody>
-      </p:sp>
-      <p:sp>
-        <p:nvSpPr>
-          <p:cNvPr id="3" name="Content Placeholder 2">
-            <a:extLst>
-              <a:ext uri="{FF2B5EF4-FFF2-40B4-BE49-F238E27FC236}">
-                <a16:creationId xmlns:a16="http://schemas.microsoft.com/office/drawing/2014/main" id="{FC2B2703-B9D4-9D38-29A6-0F11EEBE883B}"/>
-              </a:ext>
-            </a:extLst>
-          </p:cNvPr>
-          <p:cNvSpPr>
-            <a:spLocks noGrp="1"/>
-          </p:cNvSpPr>
-          <p:nvPr>
-            <p:ph idx="1"/>
-          </p:nvPr>
-        </p:nvSpPr>
-        <p:spPr/>
-        <p:txBody>
-          <a:bodyPr/>
-          <a:lstStyle/>
-          <a:p>
-            <a:r>
-              <a:rPr lang="en-US" dirty="0"/>
-              <a:t>When network partition happens (P), you must choose:</a:t>
-            </a:r>
-          </a:p>
-          <a:p>
-            <a:pPr lvl="1"/>
-            <a:r>
-              <a:rPr lang="en-US" b="1" dirty="0"/>
-              <a:t>Consistency</a:t>
-            </a:r>
-            <a:r>
-              <a:rPr lang="en-US" dirty="0"/>
-              <a:t> - Reject requests until partition heals</a:t>
-            </a:r>
-          </a:p>
-          <a:p>
-            <a:pPr lvl="1"/>
-            <a:r>
-              <a:rPr lang="en-US" b="1" dirty="0"/>
-              <a:t>Availability</a:t>
-            </a:r>
-            <a:r>
-              <a:rPr lang="en-US" dirty="0"/>
-              <a:t> - Serve (possibly stale) data</a:t>
-            </a:r>
-          </a:p>
-          <a:p>
-            <a:endParaRPr lang="en-US" dirty="0"/>
-          </a:p>
-        </p:txBody>
-      </p:sp>
-    </p:spTree>
-    <p:extLst>
-      <p:ext uri="{BB962C8B-B14F-4D97-AF65-F5344CB8AC3E}">
-        <p14:creationId xmlns:p14="http://schemas.microsoft.com/office/powerpoint/2010/main" val="2966821863"/>
-      </p:ext>
-    </p:extLst>
-  </p:cSld>
-  <p:clrMapOvr>
-    <a:masterClrMapping/>
-  </p:clrMapOvr>
-</p:sld>
-</file>
-
-<file path=ppt/slides/slide29.xml><?xml version="1.0" encoding="utf-8"?>
-<p:sld xmlns:a="http://schemas.openxmlformats.org/drawingml/2006/main" xmlns:r="http://schemas.openxmlformats.org/officeDocument/2006/relationships" xmlns:p="http://schemas.openxmlformats.org/presentationml/2006/main">
-  <p:cSld>
-    <p:spTree>
-      <p:nvGrpSpPr>
-        <p:cNvPr id="1" name="">
-          <a:extLst>
-            <a:ext uri="{FF2B5EF4-FFF2-40B4-BE49-F238E27FC236}">
-              <a16:creationId xmlns:a16="http://schemas.microsoft.com/office/drawing/2014/main" id="{2769F5B4-545F-336E-FA7C-7E493523D0E7}"/>
-            </a:ext>
-          </a:extLst>
-        </p:cNvPr>
-        <p:cNvGrpSpPr/>
-        <p:nvPr/>
-      </p:nvGrpSpPr>
-      <p:grpSpPr>
-        <a:xfrm>
-          <a:off x="0" y="0"/>
-          <a:ext cx="0" cy="0"/>
-          <a:chOff x="0" y="0"/>
-          <a:chExt cx="0" cy="0"/>
-        </a:xfrm>
-      </p:grpSpPr>
-      <p:sp>
-        <p:nvSpPr>
-          <p:cNvPr id="2" name="Title 1">
-            <a:extLst>
-              <a:ext uri="{FF2B5EF4-FFF2-40B4-BE49-F238E27FC236}">
-                <a16:creationId xmlns:a16="http://schemas.microsoft.com/office/drawing/2014/main" id="{F71200D5-F318-77F3-519E-23831001D98F}"/>
-              </a:ext>
-            </a:extLst>
-          </p:cNvPr>
-          <p:cNvSpPr>
-            <a:spLocks noGrp="1"/>
-          </p:cNvSpPr>
-          <p:nvPr>
-            <p:ph type="title"/>
-          </p:nvPr>
-        </p:nvSpPr>
-        <p:spPr/>
-        <p:txBody>
-          <a:bodyPr/>
-          <a:lstStyle/>
-          <a:p>
-            <a:r>
-              <a:rPr lang="en-US" dirty="0"/>
-              <a:t>CAP Theorem - </a:t>
-            </a:r>
-            <a:r>
-              <a:rPr lang="en-US" b="1" dirty="0"/>
-              <a:t>CP Systems (Consistency + Partition Tolerance)</a:t>
-            </a:r>
-            <a:endParaRPr lang="en-US" dirty="0"/>
-          </a:p>
-        </p:txBody>
-      </p:sp>
-      <p:sp>
-        <p:nvSpPr>
-          <p:cNvPr id="3" name="Content Placeholder 2">
-            <a:extLst>
-              <a:ext uri="{FF2B5EF4-FFF2-40B4-BE49-F238E27FC236}">
-                <a16:creationId xmlns:a16="http://schemas.microsoft.com/office/drawing/2014/main" id="{0AB4A04A-28D4-D076-96A9-028D2679ECC5}"/>
-              </a:ext>
-            </a:extLst>
-          </p:cNvPr>
-          <p:cNvSpPr>
-            <a:spLocks noGrp="1"/>
-          </p:cNvSpPr>
-          <p:nvPr>
-            <p:ph idx="1"/>
-          </p:nvPr>
-        </p:nvSpPr>
-        <p:spPr/>
-        <p:txBody>
-          <a:bodyPr>
-            <a:normAutofit fontScale="92500" lnSpcReduction="10000"/>
-          </a:bodyPr>
-          <a:lstStyle/>
-          <a:p>
-            <a:r>
-              <a:rPr lang="en-US" b="1" dirty="0"/>
-              <a:t>Characteristics:</a:t>
-            </a:r>
-            <a:endParaRPr lang="en-US" dirty="0"/>
-          </a:p>
-          <a:p>
-            <a:pPr lvl="1"/>
-            <a:r>
-              <a:rPr lang="en-US" dirty="0"/>
-              <a:t>Sacrifice availability during partition</a:t>
-            </a:r>
-          </a:p>
-          <a:p>
-            <a:pPr lvl="1"/>
-            <a:r>
-              <a:rPr lang="en-US" dirty="0"/>
-              <a:t>Returns errors rather than stale data</a:t>
-            </a:r>
-          </a:p>
-          <a:p>
-            <a:pPr lvl="1"/>
-            <a:r>
-              <a:rPr lang="en-US" dirty="0"/>
-              <a:t>Strong consistency guarantees</a:t>
-            </a:r>
-          </a:p>
-          <a:p>
-            <a:r>
-              <a:rPr lang="en-US" b="1" dirty="0"/>
-              <a:t>When partition occurs:</a:t>
-            </a:r>
-            <a:r>
-              <a:rPr lang="en-US" dirty="0"/>
-              <a:t> ❌ Some nodes become unavailable ✅ Data remains consistent</a:t>
-            </a:r>
-          </a:p>
-          <a:p>
-            <a:r>
-              <a:rPr lang="en-US" b="1" dirty="0"/>
-              <a:t>Examples:</a:t>
-            </a:r>
-            <a:endParaRPr lang="en-US" dirty="0"/>
-          </a:p>
-          <a:p>
-            <a:pPr lvl="1"/>
-            <a:r>
-              <a:rPr lang="en-US" dirty="0"/>
-              <a:t>MongoDB (with strong consistency)</a:t>
-            </a:r>
-          </a:p>
-          <a:p>
-            <a:pPr lvl="1"/>
-            <a:r>
-              <a:rPr lang="en-US" dirty="0"/>
-              <a:t>HBase</a:t>
-            </a:r>
-          </a:p>
-          <a:p>
-            <a:pPr lvl="1"/>
-            <a:r>
-              <a:rPr lang="en-US" dirty="0"/>
-              <a:t>Redis (in certain configs)</a:t>
-            </a:r>
-          </a:p>
-          <a:p>
-            <a:pPr lvl="1"/>
-            <a:r>
-              <a:rPr lang="en-US" dirty="0"/>
-              <a:t>Banking systems, financial transactions</a:t>
-            </a:r>
-          </a:p>
-          <a:p>
-            <a:endParaRPr lang="en-US" dirty="0"/>
-          </a:p>
-        </p:txBody>
-      </p:sp>
-    </p:spTree>
-    <p:extLst>
-      <p:ext uri="{BB962C8B-B14F-4D97-AF65-F5344CB8AC3E}">
-        <p14:creationId xmlns:p14="http://schemas.microsoft.com/office/powerpoint/2010/main" val="924440317"/>
       </p:ext>
     </p:extLst>
   </p:cSld>
@@ -12076,6 +13700,286 @@
   <p:cSld>
     <p:spTree>
       <p:nvGrpSpPr>
+        <p:cNvPr id="1" name=""/>
+        <p:cNvGrpSpPr/>
+        <p:nvPr/>
+      </p:nvGrpSpPr>
+      <p:grpSpPr>
+        <a:xfrm>
+          <a:off x="0" y="0"/>
+          <a:ext cx="0" cy="0"/>
+          <a:chOff x="0" y="0"/>
+          <a:chExt cx="0" cy="0"/>
+        </a:xfrm>
+      </p:grpSpPr>
+      <p:sp>
+        <p:nvSpPr>
+          <p:cNvPr id="2" name="Title 1">
+            <a:extLst>
+              <a:ext uri="{FF2B5EF4-FFF2-40B4-BE49-F238E27FC236}">
+                <a16:creationId xmlns:a16="http://schemas.microsoft.com/office/drawing/2014/main" id="{8E73C055-2D8A-FA26-1D50-C195EC2C9C3E}"/>
+              </a:ext>
+            </a:extLst>
+          </p:cNvPr>
+          <p:cNvSpPr>
+            <a:spLocks noGrp="1"/>
+          </p:cNvSpPr>
+          <p:nvPr>
+            <p:ph type="title"/>
+          </p:nvPr>
+        </p:nvSpPr>
+        <p:spPr/>
+        <p:txBody>
+          <a:bodyPr/>
+          <a:lstStyle/>
+          <a:p>
+            <a:r>
+              <a:rPr lang="en-US" dirty="0"/>
+              <a:t>CAP Theorem</a:t>
+            </a:r>
+          </a:p>
+        </p:txBody>
+      </p:sp>
+      <p:sp>
+        <p:nvSpPr>
+          <p:cNvPr id="3" name="Content Placeholder 2">
+            <a:extLst>
+              <a:ext uri="{FF2B5EF4-FFF2-40B4-BE49-F238E27FC236}">
+                <a16:creationId xmlns:a16="http://schemas.microsoft.com/office/drawing/2014/main" id="{FC2B2703-B9D4-9D38-29A6-0F11EEBE883B}"/>
+              </a:ext>
+            </a:extLst>
+          </p:cNvPr>
+          <p:cNvSpPr>
+            <a:spLocks noGrp="1"/>
+          </p:cNvSpPr>
+          <p:nvPr>
+            <p:ph idx="1"/>
+          </p:nvPr>
+        </p:nvSpPr>
+        <p:spPr/>
+        <p:txBody>
+          <a:bodyPr/>
+          <a:lstStyle/>
+          <a:p>
+            <a:r>
+              <a:rPr lang="en-US" dirty="0"/>
+              <a:t>When network partition happens (P), you must choose:</a:t>
+            </a:r>
+          </a:p>
+          <a:p>
+            <a:pPr lvl="1"/>
+            <a:r>
+              <a:rPr lang="en-US" b="1" dirty="0"/>
+              <a:t>Consistency</a:t>
+            </a:r>
+            <a:r>
+              <a:rPr lang="en-US" dirty="0"/>
+              <a:t> - Reject requests until partition heals</a:t>
+            </a:r>
+          </a:p>
+          <a:p>
+            <a:pPr lvl="1"/>
+            <a:r>
+              <a:rPr lang="en-US" b="1" dirty="0"/>
+              <a:t>Availability</a:t>
+            </a:r>
+            <a:r>
+              <a:rPr lang="en-US" dirty="0"/>
+              <a:t> - Serve (possibly stale) data</a:t>
+            </a:r>
+          </a:p>
+          <a:p>
+            <a:endParaRPr lang="en-US" dirty="0"/>
+          </a:p>
+        </p:txBody>
+      </p:sp>
+    </p:spTree>
+    <p:extLst>
+      <p:ext uri="{BB962C8B-B14F-4D97-AF65-F5344CB8AC3E}">
+        <p14:creationId xmlns:p14="http://schemas.microsoft.com/office/powerpoint/2010/main" val="2966821863"/>
+      </p:ext>
+    </p:extLst>
+  </p:cSld>
+  <p:clrMapOvr>
+    <a:masterClrMapping/>
+  </p:clrMapOvr>
+</p:sld>
+</file>
+
+<file path=ppt/slides/slide31.xml><?xml version="1.0" encoding="utf-8"?>
+<p:sld xmlns:a="http://schemas.openxmlformats.org/drawingml/2006/main" xmlns:r="http://schemas.openxmlformats.org/officeDocument/2006/relationships" xmlns:p="http://schemas.openxmlformats.org/presentationml/2006/main">
+  <p:cSld>
+    <p:spTree>
+      <p:nvGrpSpPr>
+        <p:cNvPr id="1" name="">
+          <a:extLst>
+            <a:ext uri="{FF2B5EF4-FFF2-40B4-BE49-F238E27FC236}">
+              <a16:creationId xmlns:a16="http://schemas.microsoft.com/office/drawing/2014/main" id="{2769F5B4-545F-336E-FA7C-7E493523D0E7}"/>
+            </a:ext>
+          </a:extLst>
+        </p:cNvPr>
+        <p:cNvGrpSpPr/>
+        <p:nvPr/>
+      </p:nvGrpSpPr>
+      <p:grpSpPr>
+        <a:xfrm>
+          <a:off x="0" y="0"/>
+          <a:ext cx="0" cy="0"/>
+          <a:chOff x="0" y="0"/>
+          <a:chExt cx="0" cy="0"/>
+        </a:xfrm>
+      </p:grpSpPr>
+      <p:sp>
+        <p:nvSpPr>
+          <p:cNvPr id="2" name="Title 1">
+            <a:extLst>
+              <a:ext uri="{FF2B5EF4-FFF2-40B4-BE49-F238E27FC236}">
+                <a16:creationId xmlns:a16="http://schemas.microsoft.com/office/drawing/2014/main" id="{F71200D5-F318-77F3-519E-23831001D98F}"/>
+              </a:ext>
+            </a:extLst>
+          </p:cNvPr>
+          <p:cNvSpPr>
+            <a:spLocks noGrp="1"/>
+          </p:cNvSpPr>
+          <p:nvPr>
+            <p:ph type="title"/>
+          </p:nvPr>
+        </p:nvSpPr>
+        <p:spPr/>
+        <p:txBody>
+          <a:bodyPr/>
+          <a:lstStyle/>
+          <a:p>
+            <a:r>
+              <a:rPr lang="en-US" dirty="0"/>
+              <a:t>CAP Theorem - </a:t>
+            </a:r>
+            <a:r>
+              <a:rPr lang="en-US" b="1" dirty="0"/>
+              <a:t>CP Systems (Consistency + Partition Tolerance)</a:t>
+            </a:r>
+            <a:endParaRPr lang="en-US" dirty="0"/>
+          </a:p>
+        </p:txBody>
+      </p:sp>
+      <p:sp>
+        <p:nvSpPr>
+          <p:cNvPr id="3" name="Content Placeholder 2">
+            <a:extLst>
+              <a:ext uri="{FF2B5EF4-FFF2-40B4-BE49-F238E27FC236}">
+                <a16:creationId xmlns:a16="http://schemas.microsoft.com/office/drawing/2014/main" id="{0AB4A04A-28D4-D076-96A9-028D2679ECC5}"/>
+              </a:ext>
+            </a:extLst>
+          </p:cNvPr>
+          <p:cNvSpPr>
+            <a:spLocks noGrp="1"/>
+          </p:cNvSpPr>
+          <p:nvPr>
+            <p:ph idx="1"/>
+          </p:nvPr>
+        </p:nvSpPr>
+        <p:spPr/>
+        <p:txBody>
+          <a:bodyPr>
+            <a:normAutofit fontScale="92500" lnSpcReduction="10000"/>
+          </a:bodyPr>
+          <a:lstStyle/>
+          <a:p>
+            <a:r>
+              <a:rPr lang="en-US" b="1" dirty="0"/>
+              <a:t>Characteristics:</a:t>
+            </a:r>
+            <a:endParaRPr lang="en-US" dirty="0"/>
+          </a:p>
+          <a:p>
+            <a:pPr lvl="1"/>
+            <a:r>
+              <a:rPr lang="en-US" dirty="0"/>
+              <a:t>Sacrifice availability during partition</a:t>
+            </a:r>
+          </a:p>
+          <a:p>
+            <a:pPr lvl="1"/>
+            <a:r>
+              <a:rPr lang="en-US" dirty="0"/>
+              <a:t>Returns errors rather than stale data</a:t>
+            </a:r>
+          </a:p>
+          <a:p>
+            <a:pPr lvl="1"/>
+            <a:r>
+              <a:rPr lang="en-US" dirty="0"/>
+              <a:t>Strong consistency guarantees</a:t>
+            </a:r>
+          </a:p>
+          <a:p>
+            <a:r>
+              <a:rPr lang="en-US" b="1" dirty="0"/>
+              <a:t>When partition occurs:</a:t>
+            </a:r>
+            <a:r>
+              <a:rPr lang="en-US" dirty="0"/>
+              <a:t> ❌ Some nodes become unavailable ✅ Data remains consistent</a:t>
+            </a:r>
+          </a:p>
+          <a:p>
+            <a:r>
+              <a:rPr lang="en-US" b="1" dirty="0"/>
+              <a:t>Examples:</a:t>
+            </a:r>
+            <a:endParaRPr lang="en-US" dirty="0"/>
+          </a:p>
+          <a:p>
+            <a:pPr lvl="1"/>
+            <a:r>
+              <a:rPr lang="en-US" dirty="0"/>
+              <a:t>MongoDB (with strong consistency)</a:t>
+            </a:r>
+          </a:p>
+          <a:p>
+            <a:pPr lvl="1"/>
+            <a:r>
+              <a:rPr lang="en-US" dirty="0"/>
+              <a:t>HBase</a:t>
+            </a:r>
+          </a:p>
+          <a:p>
+            <a:pPr lvl="1"/>
+            <a:r>
+              <a:rPr lang="en-US" dirty="0"/>
+              <a:t>Redis (in certain configs)</a:t>
+            </a:r>
+          </a:p>
+          <a:p>
+            <a:pPr lvl="1"/>
+            <a:r>
+              <a:rPr lang="en-US" dirty="0"/>
+              <a:t>Banking systems, financial transactions</a:t>
+            </a:r>
+          </a:p>
+          <a:p>
+            <a:endParaRPr lang="en-US" dirty="0"/>
+          </a:p>
+        </p:txBody>
+      </p:sp>
+    </p:spTree>
+    <p:extLst>
+      <p:ext uri="{BB962C8B-B14F-4D97-AF65-F5344CB8AC3E}">
+        <p14:creationId xmlns:p14="http://schemas.microsoft.com/office/powerpoint/2010/main" val="924440317"/>
+      </p:ext>
+    </p:extLst>
+  </p:cSld>
+  <p:clrMapOvr>
+    <a:masterClrMapping/>
+  </p:clrMapOvr>
+</p:sld>
+</file>
+
+<file path=ppt/slides/slide32.xml><?xml version="1.0" encoding="utf-8"?>
+<p:sld xmlns:a="http://schemas.openxmlformats.org/drawingml/2006/main" xmlns:r="http://schemas.openxmlformats.org/officeDocument/2006/relationships" xmlns:p="http://schemas.openxmlformats.org/presentationml/2006/main">
+  <p:cSld>
+    <p:spTree>
+      <p:nvGrpSpPr>
         <p:cNvPr id="1" name="">
           <a:extLst>
             <a:ext uri="{FF2B5EF4-FFF2-40B4-BE49-F238E27FC236}">
@@ -12240,7 +14144,7 @@
 </p:sld>
 </file>
 
-<file path=ppt/slides/slide31.xml><?xml version="1.0" encoding="utf-8"?>
+<file path=ppt/slides/slide33.xml><?xml version="1.0" encoding="utf-8"?>
 <p:sld xmlns:a="http://schemas.openxmlformats.org/drawingml/2006/main" xmlns:r="http://schemas.openxmlformats.org/officeDocument/2006/relationships" xmlns:p="http://schemas.openxmlformats.org/presentationml/2006/main">
   <p:cSld>
     <p:spTree>
@@ -12346,7 +14250,7 @@
 </p:sld>
 </file>
 
-<file path=ppt/slides/slide32.xml><?xml version="1.0" encoding="utf-8"?>
+<file path=ppt/slides/slide34.xml><?xml version="1.0" encoding="utf-8"?>
 <p:sld xmlns:a="http://schemas.openxmlformats.org/drawingml/2006/main" xmlns:r="http://schemas.openxmlformats.org/officeDocument/2006/relationships" xmlns:p="http://schemas.openxmlformats.org/presentationml/2006/main">
   <p:cSld>
     <p:spTree>
@@ -12460,7 +14364,7 @@
 </p:sld>
 </file>
 
-<file path=ppt/slides/slide33.xml><?xml version="1.0" encoding="utf-8"?>
+<file path=ppt/slides/slide35.xml><?xml version="1.0" encoding="utf-8"?>
 <p:sld xmlns:a="http://schemas.openxmlformats.org/drawingml/2006/main" xmlns:r="http://schemas.openxmlformats.org/officeDocument/2006/relationships" xmlns:p="http://schemas.openxmlformats.org/presentationml/2006/main">
   <p:cSld>
     <p:spTree>
@@ -12505,28 +14409,140 @@
           </a:p>
         </p:txBody>
       </p:sp>
-      <p:sp>
-        <p:nvSpPr>
-          <p:cNvPr id="3" name="Content Placeholder 2">
+      <p:pic>
+        <p:nvPicPr>
+          <p:cNvPr id="4" name="Content Placeholder 3">
             <a:extLst>
               <a:ext uri="{FF2B5EF4-FFF2-40B4-BE49-F238E27FC236}">
-                <a16:creationId xmlns:a16="http://schemas.microsoft.com/office/drawing/2014/main" id="{2082692D-8CB0-1F97-57EC-DEE9EEF8503E}"/>
+                <a16:creationId xmlns:a16="http://schemas.microsoft.com/office/drawing/2014/main" id="{F37AA3E2-66B6-EBCC-CCDD-3E3C58190C59}"/>
               </a:ext>
             </a:extLst>
           </p:cNvPr>
-          <p:cNvSpPr>
-            <a:spLocks noGrp="1"/>
-          </p:cNvSpPr>
+          <p:cNvPicPr>
+            <a:picLocks noGrp="1" noChangeAspect="1"/>
+          </p:cNvPicPr>
           <p:nvPr>
             <p:ph idx="1"/>
           </p:nvPr>
-        </p:nvSpPr>
-        <p:spPr/>
-        <p:txBody>
-          <a:bodyPr/>
+        </p:nvPicPr>
+        <p:blipFill>
+          <a:blip r:embed="rId3"/>
+          <a:stretch>
+            <a:fillRect/>
+          </a:stretch>
+        </p:blipFill>
+        <p:spPr>
+          <a:xfrm>
+            <a:off x="5608604" y="1460107"/>
+            <a:ext cx="2413605" cy="5223291"/>
+          </a:xfrm>
+          <a:prstGeom prst="rect">
+            <a:avLst/>
+          </a:prstGeom>
+        </p:spPr>
+      </p:pic>
+      <p:pic>
+        <p:nvPicPr>
+          <p:cNvPr id="5" name="Picture 4">
+            <a:extLst>
+              <a:ext uri="{FF2B5EF4-FFF2-40B4-BE49-F238E27FC236}">
+                <a16:creationId xmlns:a16="http://schemas.microsoft.com/office/drawing/2014/main" id="{66FDD398-AAEF-5FF2-5554-F2B3B1F6E9AC}"/>
+              </a:ext>
+            </a:extLst>
+          </p:cNvPr>
+          <p:cNvPicPr>
+            <a:picLocks noChangeAspect="1"/>
+          </p:cNvPicPr>
+          <p:nvPr/>
+        </p:nvPicPr>
+        <p:blipFill>
+          <a:blip r:embed="rId4"/>
+          <a:stretch>
+            <a:fillRect/>
+          </a:stretch>
+        </p:blipFill>
+        <p:spPr>
+          <a:xfrm>
+            <a:off x="8270262" y="1460107"/>
+            <a:ext cx="2413604" cy="5223286"/>
+          </a:xfrm>
+          <a:prstGeom prst="rect">
+            <a:avLst/>
+          </a:prstGeom>
+        </p:spPr>
+      </p:pic>
+      <p:sp>
+        <p:nvSpPr>
+          <p:cNvPr id="6" name="TextBox 5">
+            <a:extLst>
+              <a:ext uri="{FF2B5EF4-FFF2-40B4-BE49-F238E27FC236}">
+                <a16:creationId xmlns:a16="http://schemas.microsoft.com/office/drawing/2014/main" id="{ADD35307-A983-6F26-695C-7D2AC1A29930}"/>
+              </a:ext>
+            </a:extLst>
+          </p:cNvPr>
+          <p:cNvSpPr txBox="1"/>
+          <p:nvPr/>
+        </p:nvSpPr>
+        <p:spPr>
+          <a:xfrm>
+            <a:off x="680321" y="2611225"/>
+            <a:ext cx="2159566" cy="1477328"/>
+          </a:xfrm>
+          <a:prstGeom prst="rect">
+            <a:avLst/>
+          </a:prstGeom>
+          <a:noFill/>
+        </p:spPr>
+        <p:txBody>
+          <a:bodyPr wrap="none" rtlCol="0">
+            <a:spAutoFit/>
+          </a:bodyPr>
           <a:lstStyle/>
           <a:p>
-            <a:endParaRPr lang="en-US"/>
+            <a:r>
+              <a:rPr lang="en-US" dirty="0"/>
+              <a:t>Home Page</a:t>
+            </a:r>
+          </a:p>
+          <a:p>
+            <a:pPr marL="285750" indent="-285750">
+              <a:buFontTx/>
+              <a:buChar char="-"/>
+            </a:pPr>
+            <a:r>
+              <a:rPr lang="en-US" dirty="0"/>
+              <a:t>New User</a:t>
+            </a:r>
+          </a:p>
+          <a:p>
+            <a:pPr marL="285750" indent="-285750">
+              <a:buFontTx/>
+              <a:buChar char="-"/>
+            </a:pPr>
+            <a:r>
+              <a:rPr lang="en-US" dirty="0"/>
+              <a:t>Update User</a:t>
+            </a:r>
+          </a:p>
+          <a:p>
+            <a:pPr marL="285750" indent="-285750">
+              <a:buFontTx/>
+              <a:buChar char="-"/>
+            </a:pPr>
+            <a:r>
+              <a:rPr lang="en-US" dirty="0"/>
+              <a:t>Add Post</a:t>
+            </a:r>
+          </a:p>
+          <a:p>
+            <a:pPr marL="285750" indent="-285750">
+              <a:buFontTx/>
+              <a:buChar char="-"/>
+            </a:pPr>
+            <a:r>
+              <a:rPr lang="en-US" dirty="0"/>
+              <a:t>Show Homepage</a:t>
+            </a:r>
           </a:p>
         </p:txBody>
       </p:sp>
@@ -12543,7 +14559,7 @@
 </p:sld>
 </file>
 
-<file path=ppt/slides/slide34.xml><?xml version="1.0" encoding="utf-8"?>
+<file path=ppt/slides/slide36.xml><?xml version="1.0" encoding="utf-8"?>
 <p:sld xmlns:a="http://schemas.openxmlformats.org/drawingml/2006/main" xmlns:r="http://schemas.openxmlformats.org/officeDocument/2006/relationships" xmlns:p="http://schemas.openxmlformats.org/presentationml/2006/main">
   <p:cSld>
     <p:spTree>
@@ -12565,6 +14581,189 @@
           <p:cNvPr id="2" name="Title 1">
             <a:extLst>
               <a:ext uri="{FF2B5EF4-FFF2-40B4-BE49-F238E27FC236}">
+                <a16:creationId xmlns:a16="http://schemas.microsoft.com/office/drawing/2014/main" id="{BBADA910-2C7F-F9D3-D580-6AF5F76DC68B}"/>
+              </a:ext>
+            </a:extLst>
+          </p:cNvPr>
+          <p:cNvSpPr>
+            <a:spLocks noGrp="1"/>
+          </p:cNvSpPr>
+          <p:nvPr>
+            <p:ph type="title"/>
+          </p:nvPr>
+        </p:nvSpPr>
+        <p:spPr/>
+        <p:txBody>
+          <a:bodyPr/>
+          <a:lstStyle/>
+          <a:p>
+            <a:r>
+              <a:rPr lang="en-US" dirty="0"/>
+              <a:t>System</a:t>
+            </a:r>
+            <a:r>
+              <a:rPr lang="zh-CN" altLang="en-US" dirty="0"/>
+              <a:t> </a:t>
+            </a:r>
+            <a:r>
+              <a:rPr lang="en-US" altLang="zh-CN" dirty="0"/>
+              <a:t>Design</a:t>
+            </a:r>
+            <a:r>
+              <a:rPr lang="zh-CN" altLang="en-US" dirty="0"/>
+              <a:t> </a:t>
+            </a:r>
+            <a:r>
+              <a:rPr lang="en-US" altLang="zh-CN" dirty="0"/>
+              <a:t>Components</a:t>
+            </a:r>
+            <a:endParaRPr lang="en-US" dirty="0"/>
+          </a:p>
+        </p:txBody>
+      </p:sp>
+      <p:sp>
+        <p:nvSpPr>
+          <p:cNvPr id="3" name="Content Placeholder 2">
+            <a:extLst>
+              <a:ext uri="{FF2B5EF4-FFF2-40B4-BE49-F238E27FC236}">
+                <a16:creationId xmlns:a16="http://schemas.microsoft.com/office/drawing/2014/main" id="{A871E53C-EE39-A495-E028-B9C8E658D54F}"/>
+              </a:ext>
+            </a:extLst>
+          </p:cNvPr>
+          <p:cNvSpPr>
+            <a:spLocks noGrp="1"/>
+          </p:cNvSpPr>
+          <p:nvPr>
+            <p:ph idx="1"/>
+          </p:nvPr>
+        </p:nvSpPr>
+        <p:spPr/>
+        <p:txBody>
+          <a:bodyPr numCol="2"/>
+          <a:lstStyle/>
+          <a:p>
+            <a:r>
+              <a:rPr lang="en-US" dirty="0"/>
+              <a:t>User</a:t>
+            </a:r>
+            <a:r>
+              <a:rPr lang="zh-CN" altLang="en-US" dirty="0"/>
+              <a:t> </a:t>
+            </a:r>
+            <a:r>
+              <a:rPr lang="en-US" altLang="zh-CN" dirty="0"/>
+              <a:t>Experience</a:t>
+            </a:r>
+          </a:p>
+          <a:p>
+            <a:r>
+              <a:rPr lang="en-US" dirty="0"/>
+              <a:t>High Level Design</a:t>
+            </a:r>
+          </a:p>
+          <a:p>
+            <a:r>
+              <a:rPr lang="en-US" dirty="0"/>
+              <a:t>API Design</a:t>
+            </a:r>
+          </a:p>
+          <a:p>
+            <a:r>
+              <a:rPr lang="en-US" dirty="0"/>
+              <a:t>Data Schema Design</a:t>
+            </a:r>
+          </a:p>
+          <a:p>
+            <a:r>
+              <a:rPr lang="en-US" dirty="0"/>
+              <a:t>Scaling strategy</a:t>
+            </a:r>
+          </a:p>
+          <a:p>
+            <a:r>
+              <a:rPr lang="en-US" dirty="0"/>
+              <a:t>Availability &amp; fault tolerance</a:t>
+            </a:r>
+          </a:p>
+          <a:p>
+            <a:r>
+              <a:rPr lang="en-US" dirty="0"/>
+              <a:t>Security considerations</a:t>
+            </a:r>
+          </a:p>
+          <a:p>
+            <a:r>
+              <a:rPr lang="en-US" dirty="0"/>
+              <a:t>Performance optimization techniques</a:t>
+            </a:r>
+          </a:p>
+          <a:p>
+            <a:r>
+              <a:rPr lang="en-US" dirty="0"/>
+              <a:t>Cost</a:t>
+            </a:r>
+          </a:p>
+          <a:p>
+            <a:r>
+              <a:rPr lang="en-US" dirty="0"/>
+              <a:t>Testing Strategy</a:t>
+            </a:r>
+          </a:p>
+          <a:p>
+            <a:r>
+              <a:rPr lang="en-US" dirty="0"/>
+              <a:t>Operations &amp; Observability</a:t>
+            </a:r>
+          </a:p>
+          <a:p>
+            <a:r>
+              <a:rPr lang="en-US" dirty="0"/>
+              <a:t>Migration &amp; Rollout Plan</a:t>
+            </a:r>
+          </a:p>
+          <a:p>
+            <a:r>
+              <a:rPr lang="en-US" dirty="0"/>
+              <a:t>Estimation </a:t>
+            </a:r>
+          </a:p>
+        </p:txBody>
+      </p:sp>
+    </p:spTree>
+    <p:extLst>
+      <p:ext uri="{BB962C8B-B14F-4D97-AF65-F5344CB8AC3E}">
+        <p14:creationId xmlns:p14="http://schemas.microsoft.com/office/powerpoint/2010/main" val="2149388829"/>
+      </p:ext>
+    </p:extLst>
+  </p:cSld>
+  <p:clrMapOvr>
+    <a:masterClrMapping/>
+  </p:clrMapOvr>
+</p:sld>
+</file>
+
+<file path=ppt/slides/slide37.xml><?xml version="1.0" encoding="utf-8"?>
+<p:sld xmlns:a="http://schemas.openxmlformats.org/drawingml/2006/main" xmlns:r="http://schemas.openxmlformats.org/officeDocument/2006/relationships" xmlns:p="http://schemas.openxmlformats.org/presentationml/2006/main">
+  <p:cSld>
+    <p:spTree>
+      <p:nvGrpSpPr>
+        <p:cNvPr id="1" name=""/>
+        <p:cNvGrpSpPr/>
+        <p:nvPr/>
+      </p:nvGrpSpPr>
+      <p:grpSpPr>
+        <a:xfrm>
+          <a:off x="0" y="0"/>
+          <a:ext cx="0" cy="0"/>
+          <a:chOff x="0" y="0"/>
+          <a:chExt cx="0" cy="0"/>
+        </a:xfrm>
+      </p:grpSpPr>
+      <p:sp>
+        <p:nvSpPr>
+          <p:cNvPr id="2" name="Title 1">
+            <a:extLst>
+              <a:ext uri="{FF2B5EF4-FFF2-40B4-BE49-F238E27FC236}">
                 <a16:creationId xmlns:a16="http://schemas.microsoft.com/office/drawing/2014/main" id="{111BC8F6-414E-A012-500C-4D18F4E1B46A}"/>
               </a:ext>
             </a:extLst>
@@ -12583,7 +14782,7 @@
           <a:p>
             <a:r>
               <a:rPr lang="en-US" dirty="0"/>
-              <a:t>Micro Service</a:t>
+              <a:t>Write Clear User Stories</a:t>
             </a:r>
           </a:p>
         </p:txBody>
@@ -12609,7 +14808,17 @@
           <a:bodyPr/>
           <a:lstStyle/>
           <a:p>
-            <a:endParaRPr lang="en-US"/>
+            <a:r>
+              <a:rPr lang="en-US" dirty="0"/>
+              <a:t>A user story is a short, simple description of a feature from the end-user's perspective, typically following this format:</a:t>
+            </a:r>
+          </a:p>
+          <a:p>
+            <a:r>
+              <a:rPr lang="en-US" b="1" dirty="0"/>
+              <a:t>"As a [type of user], I want [goal/desire], so that [benefit/reason]"</a:t>
+            </a:r>
+            <a:endParaRPr lang="en-US" dirty="0"/>
           </a:p>
         </p:txBody>
       </p:sp>
@@ -12617,6 +14826,271 @@
     <p:extLst>
       <p:ext uri="{BB962C8B-B14F-4D97-AF65-F5344CB8AC3E}">
         <p14:creationId xmlns:p14="http://schemas.microsoft.com/office/powerpoint/2010/main" val="2654603311"/>
+      </p:ext>
+    </p:extLst>
+  </p:cSld>
+  <p:clrMapOvr>
+    <a:masterClrMapping/>
+  </p:clrMapOvr>
+</p:sld>
+</file>
+
+<file path=ppt/slides/slide38.xml><?xml version="1.0" encoding="utf-8"?>
+<p:sld xmlns:a="http://schemas.openxmlformats.org/drawingml/2006/main" xmlns:r="http://schemas.openxmlformats.org/officeDocument/2006/relationships" xmlns:p="http://schemas.openxmlformats.org/presentationml/2006/main">
+  <p:cSld>
+    <p:spTree>
+      <p:nvGrpSpPr>
+        <p:cNvPr id="1" name="">
+          <a:extLst>
+            <a:ext uri="{FF2B5EF4-FFF2-40B4-BE49-F238E27FC236}">
+              <a16:creationId xmlns:a16="http://schemas.microsoft.com/office/drawing/2014/main" id="{509C72F7-632E-2364-DD70-A38834F2F6E8}"/>
+            </a:ext>
+          </a:extLst>
+        </p:cNvPr>
+        <p:cNvGrpSpPr/>
+        <p:nvPr/>
+      </p:nvGrpSpPr>
+      <p:grpSpPr>
+        <a:xfrm>
+          <a:off x="0" y="0"/>
+          <a:ext cx="0" cy="0"/>
+          <a:chOff x="0" y="0"/>
+          <a:chExt cx="0" cy="0"/>
+        </a:xfrm>
+      </p:grpSpPr>
+      <p:sp>
+        <p:nvSpPr>
+          <p:cNvPr id="2" name="Title 1">
+            <a:extLst>
+              <a:ext uri="{FF2B5EF4-FFF2-40B4-BE49-F238E27FC236}">
+                <a16:creationId xmlns:a16="http://schemas.microsoft.com/office/drawing/2014/main" id="{68771326-0EEA-54F7-0A1D-C8E9CC1D431B}"/>
+              </a:ext>
+            </a:extLst>
+          </p:cNvPr>
+          <p:cNvSpPr>
+            <a:spLocks noGrp="1"/>
+          </p:cNvSpPr>
+          <p:nvPr>
+            <p:ph type="title"/>
+          </p:nvPr>
+        </p:nvSpPr>
+        <p:spPr/>
+        <p:txBody>
+          <a:bodyPr/>
+          <a:lstStyle/>
+          <a:p>
+            <a:r>
+              <a:rPr lang="en-US" dirty="0"/>
+              <a:t>Write Clear User Stories - </a:t>
+            </a:r>
+            <a:r>
+              <a:rPr lang="en-US" b="1" dirty="0"/>
+              <a:t>Key Components</a:t>
+            </a:r>
+            <a:endParaRPr lang="en-US" dirty="0"/>
+          </a:p>
+        </p:txBody>
+      </p:sp>
+      <p:sp>
+        <p:nvSpPr>
+          <p:cNvPr id="3" name="Content Placeholder 2">
+            <a:extLst>
+              <a:ext uri="{FF2B5EF4-FFF2-40B4-BE49-F238E27FC236}">
+                <a16:creationId xmlns:a16="http://schemas.microsoft.com/office/drawing/2014/main" id="{785AA86C-70DD-9E53-3B27-3FD07D67E3A6}"/>
+              </a:ext>
+            </a:extLst>
+          </p:cNvPr>
+          <p:cNvSpPr>
+            <a:spLocks noGrp="1"/>
+          </p:cNvSpPr>
+          <p:nvPr>
+            <p:ph idx="1"/>
+          </p:nvPr>
+        </p:nvSpPr>
+        <p:spPr/>
+        <p:txBody>
+          <a:bodyPr/>
+          <a:lstStyle/>
+          <a:p>
+            <a:r>
+              <a:rPr lang="en-US" b="1" dirty="0"/>
+              <a:t>User Role</a:t>
+            </a:r>
+            <a:r>
+              <a:rPr lang="en-US" dirty="0"/>
+              <a:t>: Who wants this feature?</a:t>
+            </a:r>
+          </a:p>
+          <a:p>
+            <a:r>
+              <a:rPr lang="en-US" b="1" dirty="0"/>
+              <a:t>Action</a:t>
+            </a:r>
+            <a:r>
+              <a:rPr lang="en-US" dirty="0"/>
+              <a:t>: What do they want to do?</a:t>
+            </a:r>
+          </a:p>
+          <a:p>
+            <a:r>
+              <a:rPr lang="en-US" b="1" dirty="0"/>
+              <a:t>Business Value</a:t>
+            </a:r>
+            <a:r>
+              <a:rPr lang="en-US" dirty="0"/>
+              <a:t>: Why do they want it?</a:t>
+            </a:r>
+          </a:p>
+        </p:txBody>
+      </p:sp>
+    </p:spTree>
+    <p:extLst>
+      <p:ext uri="{BB962C8B-B14F-4D97-AF65-F5344CB8AC3E}">
+        <p14:creationId xmlns:p14="http://schemas.microsoft.com/office/powerpoint/2010/main" val="3803364448"/>
+      </p:ext>
+    </p:extLst>
+  </p:cSld>
+  <p:clrMapOvr>
+    <a:masterClrMapping/>
+  </p:clrMapOvr>
+</p:sld>
+</file>
+
+<file path=ppt/slides/slide39.xml><?xml version="1.0" encoding="utf-8"?>
+<p:sld xmlns:a="http://schemas.openxmlformats.org/drawingml/2006/main" xmlns:r="http://schemas.openxmlformats.org/officeDocument/2006/relationships" xmlns:p="http://schemas.openxmlformats.org/presentationml/2006/main">
+  <p:cSld>
+    <p:spTree>
+      <p:nvGrpSpPr>
+        <p:cNvPr id="1" name=""/>
+        <p:cNvGrpSpPr/>
+        <p:nvPr/>
+      </p:nvGrpSpPr>
+      <p:grpSpPr>
+        <a:xfrm>
+          <a:off x="0" y="0"/>
+          <a:ext cx="0" cy="0"/>
+          <a:chOff x="0" y="0"/>
+          <a:chExt cx="0" cy="0"/>
+        </a:xfrm>
+      </p:grpSpPr>
+      <p:sp>
+        <p:nvSpPr>
+          <p:cNvPr id="2" name="Title 1">
+            <a:extLst>
+              <a:ext uri="{FF2B5EF4-FFF2-40B4-BE49-F238E27FC236}">
+                <a16:creationId xmlns:a16="http://schemas.microsoft.com/office/drawing/2014/main" id="{E395CAF1-48F5-0920-95CD-A0B7BDE76B47}"/>
+              </a:ext>
+            </a:extLst>
+          </p:cNvPr>
+          <p:cNvSpPr>
+            <a:spLocks noGrp="1"/>
+          </p:cNvSpPr>
+          <p:nvPr>
+            <p:ph type="title"/>
+          </p:nvPr>
+        </p:nvSpPr>
+        <p:spPr/>
+        <p:txBody>
+          <a:bodyPr/>
+          <a:lstStyle/>
+          <a:p>
+            <a:r>
+              <a:rPr lang="en-US" b="1" dirty="0"/>
+              <a:t>INVEST Criteria</a:t>
+            </a:r>
+            <a:r>
+              <a:rPr lang="en-US" dirty="0"/>
+              <a:t> (Good user stories are)</a:t>
+            </a:r>
+          </a:p>
+        </p:txBody>
+      </p:sp>
+      <p:sp>
+        <p:nvSpPr>
+          <p:cNvPr id="3" name="Content Placeholder 2">
+            <a:extLst>
+              <a:ext uri="{FF2B5EF4-FFF2-40B4-BE49-F238E27FC236}">
+                <a16:creationId xmlns:a16="http://schemas.microsoft.com/office/drawing/2014/main" id="{1F895F8A-054F-7200-853C-21565CE27258}"/>
+              </a:ext>
+            </a:extLst>
+          </p:cNvPr>
+          <p:cNvSpPr>
+            <a:spLocks noGrp="1"/>
+          </p:cNvSpPr>
+          <p:nvPr>
+            <p:ph idx="1"/>
+          </p:nvPr>
+        </p:nvSpPr>
+        <p:spPr/>
+        <p:txBody>
+          <a:bodyPr/>
+          <a:lstStyle/>
+          <a:p>
+            <a:r>
+              <a:rPr lang="en-US" b="1" dirty="0"/>
+              <a:t>I</a:t>
+            </a:r>
+            <a:r>
+              <a:rPr lang="en-US" dirty="0"/>
+              <a:t>ndependent: Can be developed separately</a:t>
+            </a:r>
+          </a:p>
+          <a:p>
+            <a:r>
+              <a:rPr lang="en-US" b="1" dirty="0"/>
+              <a:t>N</a:t>
+            </a:r>
+            <a:r>
+              <a:rPr lang="en-US" dirty="0"/>
+              <a:t>egotiable: Details can be discussed</a:t>
+            </a:r>
+          </a:p>
+          <a:p>
+            <a:r>
+              <a:rPr lang="en-US" b="1" dirty="0"/>
+              <a:t>V</a:t>
+            </a:r>
+            <a:r>
+              <a:rPr lang="en-US" dirty="0"/>
+              <a:t>aluable: Delivers value to users</a:t>
+            </a:r>
+          </a:p>
+          <a:p>
+            <a:r>
+              <a:rPr lang="en-US" b="1" dirty="0"/>
+              <a:t>E</a:t>
+            </a:r>
+            <a:r>
+              <a:rPr lang="en-US" dirty="0"/>
+              <a:t>stimable: Can be sized/estimated</a:t>
+            </a:r>
+          </a:p>
+          <a:p>
+            <a:r>
+              <a:rPr lang="en-US" b="1" dirty="0"/>
+              <a:t>S</a:t>
+            </a:r>
+            <a:r>
+              <a:rPr lang="en-US" dirty="0"/>
+              <a:t>mall: Fits within a sprint</a:t>
+            </a:r>
+          </a:p>
+          <a:p>
+            <a:r>
+              <a:rPr lang="en-US" b="1" dirty="0"/>
+              <a:t>T</a:t>
+            </a:r>
+            <a:r>
+              <a:rPr lang="en-US" dirty="0"/>
+              <a:t>estable: Clear acceptance criteria</a:t>
+            </a:r>
+          </a:p>
+        </p:txBody>
+      </p:sp>
+    </p:spTree>
+    <p:extLst>
+      <p:ext uri="{BB962C8B-B14F-4D97-AF65-F5344CB8AC3E}">
+        <p14:creationId xmlns:p14="http://schemas.microsoft.com/office/powerpoint/2010/main" val="1027845861"/>
       </p:ext>
     </p:extLst>
   </p:cSld>
@@ -12762,6 +15236,108 @@
     <p:extLst>
       <p:ext uri="{BB962C8B-B14F-4D97-AF65-F5344CB8AC3E}">
         <p14:creationId xmlns:p14="http://schemas.microsoft.com/office/powerpoint/2010/main" val="213492555"/>
+      </p:ext>
+    </p:extLst>
+  </p:cSld>
+  <p:clrMapOvr>
+    <a:masterClrMapping/>
+  </p:clrMapOvr>
+</p:sld>
+</file>
+
+<file path=ppt/slides/slide40.xml><?xml version="1.0" encoding="utf-8"?>
+<p:sld xmlns:a="http://schemas.openxmlformats.org/drawingml/2006/main" xmlns:r="http://schemas.openxmlformats.org/officeDocument/2006/relationships" xmlns:p="http://schemas.openxmlformats.org/presentationml/2006/main">
+  <p:cSld>
+    <p:spTree>
+      <p:nvGrpSpPr>
+        <p:cNvPr id="1" name=""/>
+        <p:cNvGrpSpPr/>
+        <p:nvPr/>
+      </p:nvGrpSpPr>
+      <p:grpSpPr>
+        <a:xfrm>
+          <a:off x="0" y="0"/>
+          <a:ext cx="0" cy="0"/>
+          <a:chOff x="0" y="0"/>
+          <a:chExt cx="0" cy="0"/>
+        </a:xfrm>
+      </p:grpSpPr>
+      <p:sp>
+        <p:nvSpPr>
+          <p:cNvPr id="2" name="Title 1">
+            <a:extLst>
+              <a:ext uri="{FF2B5EF4-FFF2-40B4-BE49-F238E27FC236}">
+                <a16:creationId xmlns:a16="http://schemas.microsoft.com/office/drawing/2014/main" id="{210078AC-C9F0-8883-B958-19D8E58AE2A2}"/>
+              </a:ext>
+            </a:extLst>
+          </p:cNvPr>
+          <p:cNvSpPr>
+            <a:spLocks noGrp="1"/>
+          </p:cNvSpPr>
+          <p:nvPr>
+            <p:ph type="title"/>
+          </p:nvPr>
+        </p:nvSpPr>
+        <p:spPr/>
+        <p:txBody>
+          <a:bodyPr/>
+          <a:lstStyle/>
+          <a:p>
+            <a:r>
+              <a:rPr lang="en-US" b="1" dirty="0"/>
+              <a:t>Acceptance Criteria:</a:t>
+            </a:r>
+            <a:endParaRPr lang="en-US" dirty="0"/>
+          </a:p>
+        </p:txBody>
+      </p:sp>
+      <p:sp>
+        <p:nvSpPr>
+          <p:cNvPr id="3" name="Content Placeholder 2">
+            <a:extLst>
+              <a:ext uri="{FF2B5EF4-FFF2-40B4-BE49-F238E27FC236}">
+                <a16:creationId xmlns:a16="http://schemas.microsoft.com/office/drawing/2014/main" id="{7DEB90CA-7A98-4CC3-8FFF-A3C445667785}"/>
+              </a:ext>
+            </a:extLst>
+          </p:cNvPr>
+          <p:cNvSpPr>
+            <a:spLocks noGrp="1"/>
+          </p:cNvSpPr>
+          <p:nvPr>
+            <p:ph idx="1"/>
+          </p:nvPr>
+        </p:nvSpPr>
+        <p:spPr/>
+        <p:txBody>
+          <a:bodyPr/>
+          <a:lstStyle/>
+          <a:p>
+            <a:r>
+              <a:rPr lang="en-US" dirty="0"/>
+              <a:t>Specific conditions that must be met</a:t>
+            </a:r>
+          </a:p>
+          <a:p>
+            <a:r>
+              <a:rPr lang="en-US" dirty="0"/>
+              <a:t>Written as "Given-When-Then" scenarios</a:t>
+            </a:r>
+          </a:p>
+          <a:p>
+            <a:r>
+              <a:rPr lang="en-US"/>
+              <a:t>Defines "done"</a:t>
+            </a:r>
+          </a:p>
+          <a:p>
+            <a:endParaRPr lang="en-US"/>
+          </a:p>
+        </p:txBody>
+      </p:sp>
+    </p:spTree>
+    <p:extLst>
+      <p:ext uri="{BB962C8B-B14F-4D97-AF65-F5344CB8AC3E}">
+        <p14:creationId xmlns:p14="http://schemas.microsoft.com/office/powerpoint/2010/main" val="1146524542"/>
       </p:ext>
     </p:extLst>
   </p:cSld>

</xml_diff>